<commit_message>
Updates to threat model and readme
</commit_message>
<xml_diff>
--- a/Threat Modeling.pptx
+++ b/Threat Modeling.pptx
@@ -5,24 +5,25 @@
     <p:sldMasterId id="2147483648" r:id="rId1"/>
   </p:sldMasterIdLst>
   <p:notesMasterIdLst>
-    <p:notesMasterId r:id="rId17"/>
+    <p:notesMasterId r:id="rId18"/>
   </p:notesMasterIdLst>
   <p:sldIdLst>
     <p:sldId id="256" r:id="rId2"/>
     <p:sldId id="267" r:id="rId3"/>
     <p:sldId id="259" r:id="rId4"/>
-    <p:sldId id="258" r:id="rId5"/>
-    <p:sldId id="269" r:id="rId6"/>
-    <p:sldId id="260" r:id="rId7"/>
-    <p:sldId id="261" r:id="rId8"/>
-    <p:sldId id="264" r:id="rId9"/>
-    <p:sldId id="263" r:id="rId10"/>
-    <p:sldId id="262" r:id="rId11"/>
-    <p:sldId id="265" r:id="rId12"/>
-    <p:sldId id="266" r:id="rId13"/>
-    <p:sldId id="268" r:id="rId14"/>
-    <p:sldId id="270" r:id="rId15"/>
-    <p:sldId id="271" r:id="rId16"/>
+    <p:sldId id="272" r:id="rId5"/>
+    <p:sldId id="258" r:id="rId6"/>
+    <p:sldId id="269" r:id="rId7"/>
+    <p:sldId id="260" r:id="rId8"/>
+    <p:sldId id="261" r:id="rId9"/>
+    <p:sldId id="264" r:id="rId10"/>
+    <p:sldId id="263" r:id="rId11"/>
+    <p:sldId id="262" r:id="rId12"/>
+    <p:sldId id="265" r:id="rId13"/>
+    <p:sldId id="266" r:id="rId14"/>
+    <p:sldId id="268" r:id="rId15"/>
+    <p:sldId id="270" r:id="rId16"/>
+    <p:sldId id="271" r:id="rId17"/>
   </p:sldIdLst>
   <p:sldSz cx="12192000" cy="6858000"/>
   <p:notesSz cx="6858000" cy="9144000"/>
@@ -211,7 +212,7 @@
           <a:p>
             <a:fld id="{FDD954EC-9F9A-4AE5-BEA6-0441A9210849}" type="datetimeFigureOut">
               <a:rPr lang="en-US" smtClean="0"/>
-              <a:t>9/6/2015</a:t>
+              <a:t>9/8/2015</a:t>
             </a:fld>
             <a:endParaRPr lang="en-US"/>
           </a:p>
@@ -568,7 +569,7 @@
           <a:p>
             <a:fld id="{391520E7-CE32-4CB0-9A55-B201658CA0F1}" type="slidenum">
               <a:rPr lang="en-US" smtClean="0"/>
-              <a:t>5</a:t>
+              <a:t>6</a:t>
             </a:fld>
             <a:endParaRPr lang="en-US"/>
           </a:p>
@@ -660,7 +661,7 @@
           <a:p>
             <a:fld id="{391520E7-CE32-4CB0-9A55-B201658CA0F1}" type="slidenum">
               <a:rPr lang="en-US" smtClean="0"/>
-              <a:t>8</a:t>
+              <a:t>9</a:t>
             </a:fld>
             <a:endParaRPr lang="en-US"/>
           </a:p>
@@ -736,7 +737,7 @@
           <a:noFill/>
           <a:extLst>
             <a:ext uri="{909E8E84-426E-40dd-AFC4-6F175D3DCCD1}">
-              <a14:hiddenFill xmlns="" xmlns:a14="http://schemas.microsoft.com/office/drawing/2010/main">
+              <a14:hiddenFill xmlns:a14="http://schemas.microsoft.com/office/drawing/2010/main" xmlns="">
                 <a:solidFill>
                   <a:srgbClr val="FFFFFF"/>
                 </a:solidFill>
@@ -795,7 +796,7 @@
             </a:ln>
             <a:extLst>
               <a:ext uri="{91240B29-F687-4f45-9708-019B960494DF}">
-                <a14:hiddenLine xmlns="" xmlns:a14="http://schemas.microsoft.com/office/drawing/2010/main" w="9525">
+                <a14:hiddenLine xmlns:a14="http://schemas.microsoft.com/office/drawing/2010/main" xmlns="" w="9525">
                   <a:solidFill>
                     <a:srgbClr val="000000"/>
                   </a:solidFill>
@@ -885,7 +886,7 @@
             </a:ln>
             <a:extLst>
               <a:ext uri="{91240B29-F687-4f45-9708-019B960494DF}">
-                <a14:hiddenLine xmlns="" xmlns:a14="http://schemas.microsoft.com/office/drawing/2010/main" w="9525">
+                <a14:hiddenLine xmlns:a14="http://schemas.microsoft.com/office/drawing/2010/main" xmlns="" w="9525">
                   <a:solidFill>
                     <a:srgbClr val="000000"/>
                   </a:solidFill>
@@ -975,7 +976,7 @@
             </a:ln>
             <a:extLst>
               <a:ext uri="{91240B29-F687-4f45-9708-019B960494DF}">
-                <a14:hiddenLine xmlns="" xmlns:a14="http://schemas.microsoft.com/office/drawing/2010/main" w="9525">
+                <a14:hiddenLine xmlns:a14="http://schemas.microsoft.com/office/drawing/2010/main" xmlns="" w="9525">
                   <a:solidFill>
                     <a:srgbClr val="000000"/>
                   </a:solidFill>
@@ -1009,7 +1010,7 @@
             </a:ln>
             <a:extLst>
               <a:ext uri="{91240B29-F687-4f45-9708-019B960494DF}">
-                <a14:hiddenLine xmlns="" xmlns:a14="http://schemas.microsoft.com/office/drawing/2010/main" w="9525">
+                <a14:hiddenLine xmlns:a14="http://schemas.microsoft.com/office/drawing/2010/main" xmlns="" w="9525">
                   <a:solidFill>
                     <a:srgbClr val="000000"/>
                   </a:solidFill>
@@ -1099,7 +1100,7 @@
             </a:ln>
             <a:extLst>
               <a:ext uri="{91240B29-F687-4f45-9708-019B960494DF}">
-                <a14:hiddenLine xmlns="" xmlns:a14="http://schemas.microsoft.com/office/drawing/2010/main" w="9525">
+                <a14:hiddenLine xmlns:a14="http://schemas.microsoft.com/office/drawing/2010/main" xmlns="" w="9525">
                   <a:solidFill>
                     <a:srgbClr val="000000"/>
                   </a:solidFill>
@@ -1161,7 +1162,7 @@
             </a:ln>
             <a:extLst>
               <a:ext uri="{91240B29-F687-4f45-9708-019B960494DF}">
-                <a14:hiddenLine xmlns="" xmlns:a14="http://schemas.microsoft.com/office/drawing/2010/main" w="9525">
+                <a14:hiddenLine xmlns:a14="http://schemas.microsoft.com/office/drawing/2010/main" xmlns="" w="9525">
                   <a:solidFill>
                     <a:srgbClr val="000000"/>
                   </a:solidFill>
@@ -1223,7 +1224,7 @@
             </a:ln>
             <a:extLst>
               <a:ext uri="{91240B29-F687-4f45-9708-019B960494DF}">
-                <a14:hiddenLine xmlns="" xmlns:a14="http://schemas.microsoft.com/office/drawing/2010/main" w="9525">
+                <a14:hiddenLine xmlns:a14="http://schemas.microsoft.com/office/drawing/2010/main" xmlns="" w="9525">
                   <a:solidFill>
                     <a:srgbClr val="000000"/>
                   </a:solidFill>
@@ -1313,7 +1314,7 @@
             </a:ln>
             <a:extLst>
               <a:ext uri="{91240B29-F687-4f45-9708-019B960494DF}">
-                <a14:hiddenLine xmlns="" xmlns:a14="http://schemas.microsoft.com/office/drawing/2010/main" w="9525">
+                <a14:hiddenLine xmlns:a14="http://schemas.microsoft.com/office/drawing/2010/main" xmlns="" w="9525">
                   <a:solidFill>
                     <a:srgbClr val="000000"/>
                   </a:solidFill>
@@ -1375,7 +1376,7 @@
             </a:ln>
             <a:extLst>
               <a:ext uri="{91240B29-F687-4f45-9708-019B960494DF}">
-                <a14:hiddenLine xmlns="" xmlns:a14="http://schemas.microsoft.com/office/drawing/2010/main" w="9525">
+                <a14:hiddenLine xmlns:a14="http://schemas.microsoft.com/office/drawing/2010/main" xmlns="" w="9525">
                   <a:solidFill>
                     <a:srgbClr val="000000"/>
                   </a:solidFill>
@@ -1437,7 +1438,7 @@
             </a:ln>
             <a:extLst>
               <a:ext uri="{91240B29-F687-4f45-9708-019B960494DF}">
-                <a14:hiddenLine xmlns="" xmlns:a14="http://schemas.microsoft.com/office/drawing/2010/main" w="9525">
+                <a14:hiddenLine xmlns:a14="http://schemas.microsoft.com/office/drawing/2010/main" xmlns="" w="9525">
                   <a:solidFill>
                     <a:srgbClr val="000000"/>
                   </a:solidFill>
@@ -1527,7 +1528,7 @@
             </a:ln>
             <a:extLst>
               <a:ext uri="{91240B29-F687-4f45-9708-019B960494DF}">
-                <a14:hiddenLine xmlns="" xmlns:a14="http://schemas.microsoft.com/office/drawing/2010/main" w="9525">
+                <a14:hiddenLine xmlns:a14="http://schemas.microsoft.com/office/drawing/2010/main" xmlns="" w="9525">
                   <a:solidFill>
                     <a:srgbClr val="000000"/>
                   </a:solidFill>
@@ -1617,7 +1618,7 @@
             </a:ln>
             <a:extLst>
               <a:ext uri="{91240B29-F687-4f45-9708-019B960494DF}">
-                <a14:hiddenLine xmlns="" xmlns:a14="http://schemas.microsoft.com/office/drawing/2010/main" w="9525">
+                <a14:hiddenLine xmlns:a14="http://schemas.microsoft.com/office/drawing/2010/main" xmlns="" w="9525">
                   <a:solidFill>
                     <a:srgbClr val="000000"/>
                   </a:solidFill>
@@ -1679,7 +1680,7 @@
             </a:ln>
             <a:extLst>
               <a:ext uri="{91240B29-F687-4f45-9708-019B960494DF}">
-                <a14:hiddenLine xmlns="" xmlns:a14="http://schemas.microsoft.com/office/drawing/2010/main" w="9525">
+                <a14:hiddenLine xmlns:a14="http://schemas.microsoft.com/office/drawing/2010/main" xmlns="" w="9525">
                   <a:solidFill>
                     <a:srgbClr val="000000"/>
                   </a:solidFill>
@@ -1789,7 +1790,7 @@
             </a:ln>
             <a:extLst>
               <a:ext uri="{91240B29-F687-4f45-9708-019B960494DF}">
-                <a14:hiddenLine xmlns="" xmlns:a14="http://schemas.microsoft.com/office/drawing/2010/main" w="9525">
+                <a14:hiddenLine xmlns:a14="http://schemas.microsoft.com/office/drawing/2010/main" xmlns="" w="9525">
                   <a:solidFill>
                     <a:srgbClr val="000000"/>
                   </a:solidFill>
@@ -1851,7 +1852,7 @@
             </a:ln>
             <a:extLst>
               <a:ext uri="{91240B29-F687-4f45-9708-019B960494DF}">
-                <a14:hiddenLine xmlns="" xmlns:a14="http://schemas.microsoft.com/office/drawing/2010/main" w="9525">
+                <a14:hiddenLine xmlns:a14="http://schemas.microsoft.com/office/drawing/2010/main" xmlns="" w="9525">
                   <a:solidFill>
                     <a:srgbClr val="000000"/>
                   </a:solidFill>
@@ -1941,7 +1942,7 @@
             </a:ln>
             <a:extLst>
               <a:ext uri="{91240B29-F687-4f45-9708-019B960494DF}">
-                <a14:hiddenLine xmlns="" xmlns:a14="http://schemas.microsoft.com/office/drawing/2010/main" w="9525">
+                <a14:hiddenLine xmlns:a14="http://schemas.microsoft.com/office/drawing/2010/main" xmlns="" w="9525">
                   <a:solidFill>
                     <a:srgbClr val="000000"/>
                   </a:solidFill>
@@ -2031,7 +2032,7 @@
             </a:ln>
             <a:extLst>
               <a:ext uri="{91240B29-F687-4f45-9708-019B960494DF}">
-                <a14:hiddenLine xmlns="" xmlns:a14="http://schemas.microsoft.com/office/drawing/2010/main" w="9525">
+                <a14:hiddenLine xmlns:a14="http://schemas.microsoft.com/office/drawing/2010/main" xmlns="" w="9525">
                   <a:solidFill>
                     <a:srgbClr val="000000"/>
                   </a:solidFill>
@@ -2093,7 +2094,7 @@
             </a:ln>
             <a:extLst>
               <a:ext uri="{91240B29-F687-4f45-9708-019B960494DF}">
-                <a14:hiddenLine xmlns="" xmlns:a14="http://schemas.microsoft.com/office/drawing/2010/main" w="9525">
+                <a14:hiddenLine xmlns:a14="http://schemas.microsoft.com/office/drawing/2010/main" xmlns="" w="9525">
                   <a:solidFill>
                     <a:srgbClr val="000000"/>
                   </a:solidFill>
@@ -2183,7 +2184,7 @@
             </a:ln>
             <a:extLst>
               <a:ext uri="{91240B29-F687-4f45-9708-019B960494DF}">
-                <a14:hiddenLine xmlns="" xmlns:a14="http://schemas.microsoft.com/office/drawing/2010/main" w="9525">
+                <a14:hiddenLine xmlns:a14="http://schemas.microsoft.com/office/drawing/2010/main" xmlns="" w="9525">
                   <a:solidFill>
                     <a:srgbClr val="000000"/>
                   </a:solidFill>
@@ -2273,7 +2274,7 @@
             </a:ln>
             <a:extLst>
               <a:ext uri="{91240B29-F687-4f45-9708-019B960494DF}">
-                <a14:hiddenLine xmlns="" xmlns:a14="http://schemas.microsoft.com/office/drawing/2010/main" w="9525">
+                <a14:hiddenLine xmlns:a14="http://schemas.microsoft.com/office/drawing/2010/main" xmlns="" w="9525">
                   <a:solidFill>
                     <a:srgbClr val="000000"/>
                   </a:solidFill>
@@ -2329,7 +2330,7 @@
             </a:ln>
             <a:extLst>
               <a:ext uri="{91240B29-F687-4f45-9708-019B960494DF}">
-                <a14:hiddenLine xmlns="" xmlns:a14="http://schemas.microsoft.com/office/drawing/2010/main" w="9525">
+                <a14:hiddenLine xmlns:a14="http://schemas.microsoft.com/office/drawing/2010/main" xmlns="" w="9525">
                   <a:solidFill>
                     <a:srgbClr val="000000"/>
                   </a:solidFill>
@@ -2419,7 +2420,7 @@
             </a:ln>
             <a:extLst>
               <a:ext uri="{91240B29-F687-4f45-9708-019B960494DF}">
-                <a14:hiddenLine xmlns="" xmlns:a14="http://schemas.microsoft.com/office/drawing/2010/main" w="9525">
+                <a14:hiddenLine xmlns:a14="http://schemas.microsoft.com/office/drawing/2010/main" xmlns="" w="9525">
                   <a:solidFill>
                     <a:srgbClr val="000000"/>
                   </a:solidFill>
@@ -2475,7 +2476,7 @@
             </a:ln>
             <a:extLst>
               <a:ext uri="{91240B29-F687-4f45-9708-019B960494DF}">
-                <a14:hiddenLine xmlns="" xmlns:a14="http://schemas.microsoft.com/office/drawing/2010/main" w="9525">
+                <a14:hiddenLine xmlns:a14="http://schemas.microsoft.com/office/drawing/2010/main" xmlns="" w="9525">
                   <a:solidFill>
                     <a:srgbClr val="000000"/>
                   </a:solidFill>
@@ -2565,7 +2566,7 @@
             </a:ln>
             <a:extLst>
               <a:ext uri="{91240B29-F687-4f45-9708-019B960494DF}">
-                <a14:hiddenLine xmlns="" xmlns:a14="http://schemas.microsoft.com/office/drawing/2010/main" w="9525">
+                <a14:hiddenLine xmlns:a14="http://schemas.microsoft.com/office/drawing/2010/main" xmlns="" w="9525">
                   <a:solidFill>
                     <a:srgbClr val="000000"/>
                   </a:solidFill>
@@ -2633,7 +2634,7 @@
             </a:ln>
             <a:extLst>
               <a:ext uri="{91240B29-F687-4f45-9708-019B960494DF}">
-                <a14:hiddenLine xmlns="" xmlns:a14="http://schemas.microsoft.com/office/drawing/2010/main" w="9525">
+                <a14:hiddenLine xmlns:a14="http://schemas.microsoft.com/office/drawing/2010/main" xmlns="" w="9525">
                   <a:solidFill>
                     <a:srgbClr val="000000"/>
                   </a:solidFill>
@@ -2723,7 +2724,7 @@
             </a:ln>
             <a:extLst>
               <a:ext uri="{91240B29-F687-4f45-9708-019B960494DF}">
-                <a14:hiddenLine xmlns="" xmlns:a14="http://schemas.microsoft.com/office/drawing/2010/main" w="9525">
+                <a14:hiddenLine xmlns:a14="http://schemas.microsoft.com/office/drawing/2010/main" xmlns="" w="9525">
                   <a:solidFill>
                     <a:srgbClr val="000000"/>
                   </a:solidFill>
@@ -2791,7 +2792,7 @@
             </a:ln>
             <a:extLst>
               <a:ext uri="{91240B29-F687-4f45-9708-019B960494DF}">
-                <a14:hiddenLine xmlns="" xmlns:a14="http://schemas.microsoft.com/office/drawing/2010/main" w="9525">
+                <a14:hiddenLine xmlns:a14="http://schemas.microsoft.com/office/drawing/2010/main" xmlns="" w="9525">
                   <a:solidFill>
                     <a:srgbClr val="000000"/>
                   </a:solidFill>
@@ -2881,7 +2882,7 @@
             </a:ln>
             <a:extLst>
               <a:ext uri="{91240B29-F687-4f45-9708-019B960494DF}">
-                <a14:hiddenLine xmlns="" xmlns:a14="http://schemas.microsoft.com/office/drawing/2010/main" w="9525">
+                <a14:hiddenLine xmlns:a14="http://schemas.microsoft.com/office/drawing/2010/main" xmlns="" w="9525">
                   <a:solidFill>
                     <a:srgbClr val="000000"/>
                   </a:solidFill>
@@ -2915,7 +2916,7 @@
             </a:ln>
             <a:extLst>
               <a:ext uri="{91240B29-F687-4f45-9708-019B960494DF}">
-                <a14:hiddenLine xmlns="" xmlns:a14="http://schemas.microsoft.com/office/drawing/2010/main" w="9525">
+                <a14:hiddenLine xmlns:a14="http://schemas.microsoft.com/office/drawing/2010/main" xmlns="" w="9525">
                   <a:solidFill>
                     <a:srgbClr val="000000"/>
                   </a:solidFill>
@@ -3005,7 +3006,7 @@
             </a:ln>
             <a:extLst>
               <a:ext uri="{91240B29-F687-4f45-9708-019B960494DF}">
-                <a14:hiddenLine xmlns="" xmlns:a14="http://schemas.microsoft.com/office/drawing/2010/main" w="9525">
+                <a14:hiddenLine xmlns:a14="http://schemas.microsoft.com/office/drawing/2010/main" xmlns="" w="9525">
                   <a:solidFill>
                     <a:srgbClr val="000000"/>
                   </a:solidFill>
@@ -3067,7 +3068,7 @@
             </a:ln>
             <a:extLst>
               <a:ext uri="{91240B29-F687-4f45-9708-019B960494DF}">
-                <a14:hiddenLine xmlns="" xmlns:a14="http://schemas.microsoft.com/office/drawing/2010/main" w="9525">
+                <a14:hiddenLine xmlns:a14="http://schemas.microsoft.com/office/drawing/2010/main" xmlns="" w="9525">
                   <a:solidFill>
                     <a:srgbClr val="000000"/>
                   </a:solidFill>
@@ -3129,7 +3130,7 @@
             </a:ln>
             <a:extLst>
               <a:ext uri="{91240B29-F687-4f45-9708-019B960494DF}">
-                <a14:hiddenLine xmlns="" xmlns:a14="http://schemas.microsoft.com/office/drawing/2010/main" w="9525">
+                <a14:hiddenLine xmlns:a14="http://schemas.microsoft.com/office/drawing/2010/main" xmlns="" w="9525">
                   <a:solidFill>
                     <a:srgbClr val="000000"/>
                   </a:solidFill>
@@ -3219,7 +3220,7 @@
             </a:ln>
             <a:extLst>
               <a:ext uri="{91240B29-F687-4f45-9708-019B960494DF}">
-                <a14:hiddenLine xmlns="" xmlns:a14="http://schemas.microsoft.com/office/drawing/2010/main" w="9525">
+                <a14:hiddenLine xmlns:a14="http://schemas.microsoft.com/office/drawing/2010/main" xmlns="" w="9525">
                   <a:solidFill>
                     <a:srgbClr val="000000"/>
                   </a:solidFill>
@@ -3287,7 +3288,7 @@
             </a:ln>
             <a:extLst>
               <a:ext uri="{91240B29-F687-4f45-9708-019B960494DF}">
-                <a14:hiddenLine xmlns="" xmlns:a14="http://schemas.microsoft.com/office/drawing/2010/main" w="9525">
+                <a14:hiddenLine xmlns:a14="http://schemas.microsoft.com/office/drawing/2010/main" xmlns="" w="9525">
                   <a:solidFill>
                     <a:srgbClr val="000000"/>
                   </a:solidFill>
@@ -3349,7 +3350,7 @@
             </a:ln>
             <a:extLst>
               <a:ext uri="{91240B29-F687-4f45-9708-019B960494DF}">
-                <a14:hiddenLine xmlns="" xmlns:a14="http://schemas.microsoft.com/office/drawing/2010/main" w="9525">
+                <a14:hiddenLine xmlns:a14="http://schemas.microsoft.com/office/drawing/2010/main" xmlns="" w="9525">
                   <a:solidFill>
                     <a:srgbClr val="000000"/>
                   </a:solidFill>
@@ -3439,7 +3440,7 @@
             </a:ln>
             <a:extLst>
               <a:ext uri="{91240B29-F687-4f45-9708-019B960494DF}">
-                <a14:hiddenLine xmlns="" xmlns:a14="http://schemas.microsoft.com/office/drawing/2010/main" w="9525">
+                <a14:hiddenLine xmlns:a14="http://schemas.microsoft.com/office/drawing/2010/main" xmlns="" w="9525">
                   <a:solidFill>
                     <a:srgbClr val="000000"/>
                   </a:solidFill>
@@ -3501,7 +3502,7 @@
             </a:ln>
             <a:extLst>
               <a:ext uri="{91240B29-F687-4f45-9708-019B960494DF}">
-                <a14:hiddenLine xmlns="" xmlns:a14="http://schemas.microsoft.com/office/drawing/2010/main" w="9525">
+                <a14:hiddenLine xmlns:a14="http://schemas.microsoft.com/office/drawing/2010/main" xmlns="" w="9525">
                   <a:solidFill>
                     <a:srgbClr val="000000"/>
                   </a:solidFill>
@@ -3591,7 +3592,7 @@
             </a:ln>
             <a:extLst>
               <a:ext uri="{91240B29-F687-4f45-9708-019B960494DF}">
-                <a14:hiddenLine xmlns="" xmlns:a14="http://schemas.microsoft.com/office/drawing/2010/main" w="9525">
+                <a14:hiddenLine xmlns:a14="http://schemas.microsoft.com/office/drawing/2010/main" xmlns="" w="9525">
                   <a:solidFill>
                     <a:srgbClr val="000000"/>
                   </a:solidFill>
@@ -3653,7 +3654,7 @@
             </a:ln>
             <a:extLst>
               <a:ext uri="{91240B29-F687-4f45-9708-019B960494DF}">
-                <a14:hiddenLine xmlns="" xmlns:a14="http://schemas.microsoft.com/office/drawing/2010/main" w="9525">
+                <a14:hiddenLine xmlns:a14="http://schemas.microsoft.com/office/drawing/2010/main" xmlns="" w="9525">
                   <a:solidFill>
                     <a:srgbClr val="000000"/>
                   </a:solidFill>
@@ -3743,7 +3744,7 @@
             </a:ln>
             <a:extLst>
               <a:ext uri="{91240B29-F687-4f45-9708-019B960494DF}">
-                <a14:hiddenLine xmlns="" xmlns:a14="http://schemas.microsoft.com/office/drawing/2010/main" w="9525">
+                <a14:hiddenLine xmlns:a14="http://schemas.microsoft.com/office/drawing/2010/main" xmlns="" w="9525">
                   <a:solidFill>
                     <a:srgbClr val="000000"/>
                   </a:solidFill>
@@ -3777,7 +3778,7 @@
             </a:ln>
             <a:extLst>
               <a:ext uri="{91240B29-F687-4f45-9708-019B960494DF}">
-                <a14:hiddenLine xmlns="" xmlns:a14="http://schemas.microsoft.com/office/drawing/2010/main" w="9525">
+                <a14:hiddenLine xmlns:a14="http://schemas.microsoft.com/office/drawing/2010/main" xmlns="" w="9525">
                   <a:solidFill>
                     <a:srgbClr val="000000"/>
                   </a:solidFill>
@@ -3842,7 +3843,7 @@
             </a:ln>
             <a:extLst>
               <a:ext uri="{91240B29-F687-4f45-9708-019B960494DF}">
-                <a14:hiddenLine xmlns="" xmlns:a14="http://schemas.microsoft.com/office/drawing/2010/main" w="9525">
+                <a14:hiddenLine xmlns:a14="http://schemas.microsoft.com/office/drawing/2010/main" xmlns="" w="9525">
                   <a:solidFill>
                     <a:srgbClr val="000000"/>
                   </a:solidFill>
@@ -3932,7 +3933,7 @@
             </a:ln>
             <a:extLst>
               <a:ext uri="{91240B29-F687-4f45-9708-019B960494DF}">
-                <a14:hiddenLine xmlns="" xmlns:a14="http://schemas.microsoft.com/office/drawing/2010/main" w="9525">
+                <a14:hiddenLine xmlns:a14="http://schemas.microsoft.com/office/drawing/2010/main" xmlns="" w="9525">
                   <a:solidFill>
                     <a:srgbClr val="000000"/>
                   </a:solidFill>
@@ -3994,7 +3995,7 @@
             </a:ln>
             <a:extLst>
               <a:ext uri="{91240B29-F687-4f45-9708-019B960494DF}">
-                <a14:hiddenLine xmlns="" xmlns:a14="http://schemas.microsoft.com/office/drawing/2010/main" w="9525">
+                <a14:hiddenLine xmlns:a14="http://schemas.microsoft.com/office/drawing/2010/main" xmlns="" w="9525">
                   <a:solidFill>
                     <a:srgbClr val="000000"/>
                   </a:solidFill>
@@ -4084,7 +4085,7 @@
             </a:ln>
             <a:extLst>
               <a:ext uri="{91240B29-F687-4f45-9708-019B960494DF}">
-                <a14:hiddenLine xmlns="" xmlns:a14="http://schemas.microsoft.com/office/drawing/2010/main" w="9525">
+                <a14:hiddenLine xmlns:a14="http://schemas.microsoft.com/office/drawing/2010/main" xmlns="" w="9525">
                   <a:solidFill>
                     <a:srgbClr val="000000"/>
                   </a:solidFill>
@@ -4174,7 +4175,7 @@
             </a:ln>
             <a:extLst>
               <a:ext uri="{91240B29-F687-4f45-9708-019B960494DF}">
-                <a14:hiddenLine xmlns="" xmlns:a14="http://schemas.microsoft.com/office/drawing/2010/main" w="9525">
+                <a14:hiddenLine xmlns:a14="http://schemas.microsoft.com/office/drawing/2010/main" xmlns="" w="9525">
                   <a:solidFill>
                     <a:srgbClr val="000000"/>
                   </a:solidFill>
@@ -4239,7 +4240,7 @@
             </a:ln>
             <a:extLst>
               <a:ext uri="{91240B29-F687-4f45-9708-019B960494DF}">
-                <a14:hiddenLine xmlns="" xmlns:a14="http://schemas.microsoft.com/office/drawing/2010/main" w="9525">
+                <a14:hiddenLine xmlns:a14="http://schemas.microsoft.com/office/drawing/2010/main" xmlns="" w="9525">
                   <a:solidFill>
                     <a:srgbClr val="000000"/>
                   </a:solidFill>
@@ -4301,7 +4302,7 @@
             </a:ln>
             <a:extLst>
               <a:ext uri="{91240B29-F687-4f45-9708-019B960494DF}">
-                <a14:hiddenLine xmlns="" xmlns:a14="http://schemas.microsoft.com/office/drawing/2010/main" w="9525">
+                <a14:hiddenLine xmlns:a14="http://schemas.microsoft.com/office/drawing/2010/main" xmlns="" w="9525">
                   <a:solidFill>
                     <a:srgbClr val="000000"/>
                   </a:solidFill>
@@ -4391,7 +4392,7 @@
             </a:ln>
             <a:extLst>
               <a:ext uri="{91240B29-F687-4f45-9708-019B960494DF}">
-                <a14:hiddenLine xmlns="" xmlns:a14="http://schemas.microsoft.com/office/drawing/2010/main" w="9525">
+                <a14:hiddenLine xmlns:a14="http://schemas.microsoft.com/office/drawing/2010/main" xmlns="" w="9525">
                   <a:solidFill>
                     <a:srgbClr val="000000"/>
                   </a:solidFill>
@@ -4481,7 +4482,7 @@
             </a:ln>
             <a:extLst>
               <a:ext uri="{91240B29-F687-4f45-9708-019B960494DF}">
-                <a14:hiddenLine xmlns="" xmlns:a14="http://schemas.microsoft.com/office/drawing/2010/main" w="9525">
+                <a14:hiddenLine xmlns:a14="http://schemas.microsoft.com/office/drawing/2010/main" xmlns="" w="9525">
                   <a:solidFill>
                     <a:srgbClr val="000000"/>
                   </a:solidFill>
@@ -4543,7 +4544,7 @@
             </a:ln>
             <a:extLst>
               <a:ext uri="{91240B29-F687-4f45-9708-019B960494DF}">
-                <a14:hiddenLine xmlns="" xmlns:a14="http://schemas.microsoft.com/office/drawing/2010/main" w="9525">
+                <a14:hiddenLine xmlns:a14="http://schemas.microsoft.com/office/drawing/2010/main" xmlns="" w="9525">
                   <a:solidFill>
                     <a:srgbClr val="000000"/>
                   </a:solidFill>
@@ -4663,7 +4664,7 @@
             </a:ln>
             <a:extLst>
               <a:ext uri="{91240B29-F687-4f45-9708-019B960494DF}">
-                <a14:hiddenLine xmlns="" xmlns:a14="http://schemas.microsoft.com/office/drawing/2010/main" w="9525">
+                <a14:hiddenLine xmlns:a14="http://schemas.microsoft.com/office/drawing/2010/main" xmlns="" w="9525">
                   <a:solidFill>
                     <a:srgbClr val="000000"/>
                   </a:solidFill>
@@ -4731,7 +4732,7 @@
             </a:ln>
             <a:extLst>
               <a:ext uri="{91240B29-F687-4f45-9708-019B960494DF}">
-                <a14:hiddenLine xmlns="" xmlns:a14="http://schemas.microsoft.com/office/drawing/2010/main" w="9525">
+                <a14:hiddenLine xmlns:a14="http://schemas.microsoft.com/office/drawing/2010/main" xmlns="" w="9525">
                   <a:solidFill>
                     <a:srgbClr val="000000"/>
                   </a:solidFill>
@@ -4821,7 +4822,7 @@
             </a:ln>
             <a:extLst>
               <a:ext uri="{91240B29-F687-4f45-9708-019B960494DF}">
-                <a14:hiddenLine xmlns="" xmlns:a14="http://schemas.microsoft.com/office/drawing/2010/main" w="9525">
+                <a14:hiddenLine xmlns:a14="http://schemas.microsoft.com/office/drawing/2010/main" xmlns="" w="9525">
                   <a:solidFill>
                     <a:srgbClr val="000000"/>
                   </a:solidFill>
@@ -4961,7 +4962,7 @@
           <a:p>
             <a:fld id="{48A87A34-81AB-432B-8DAE-1953F412C126}" type="datetimeFigureOut">
               <a:rPr lang="en-US" dirty="0"/>
-              <a:t>9/6/2015</a:t>
+              <a:t>9/8/2015</a:t>
             </a:fld>
             <a:endParaRPr lang="en-US" dirty="0"/>
           </a:p>
@@ -5223,7 +5224,7 @@
           <a:p>
             <a:fld id="{48A87A34-81AB-432B-8DAE-1953F412C126}" type="datetimeFigureOut">
               <a:rPr lang="en-US" dirty="0"/>
-              <a:t>9/6/2015</a:t>
+              <a:t>9/8/2015</a:t>
             </a:fld>
             <a:endParaRPr lang="en-US" dirty="0"/>
           </a:p>
@@ -5414,7 +5415,7 @@
           <a:p>
             <a:fld id="{48A87A34-81AB-432B-8DAE-1953F412C126}" type="datetimeFigureOut">
               <a:rPr lang="en-US" dirty="0"/>
-              <a:t>9/6/2015</a:t>
+              <a:t>9/8/2015</a:t>
             </a:fld>
             <a:endParaRPr lang="en-US" dirty="0"/>
           </a:p>
@@ -5672,7 +5673,7 @@
           <a:p>
             <a:fld id="{48A87A34-81AB-432B-8DAE-1953F412C126}" type="datetimeFigureOut">
               <a:rPr lang="en-US" dirty="0"/>
-              <a:t>9/6/2015</a:t>
+              <a:t>9/8/2015</a:t>
             </a:fld>
             <a:endParaRPr lang="en-US" dirty="0"/>
           </a:p>
@@ -6101,7 +6102,7 @@
           <a:p>
             <a:fld id="{48A87A34-81AB-432B-8DAE-1953F412C126}" type="datetimeFigureOut">
               <a:rPr lang="en-US" dirty="0"/>
-              <a:t>9/6/2015</a:t>
+              <a:t>9/8/2015</a:t>
             </a:fld>
             <a:endParaRPr lang="en-US" dirty="0"/>
           </a:p>
@@ -6642,7 +6643,7 @@
           <a:p>
             <a:fld id="{48A87A34-81AB-432B-8DAE-1953F412C126}" type="datetimeFigureOut">
               <a:rPr lang="en-US" dirty="0"/>
-              <a:t>9/6/2015</a:t>
+              <a:t>9/8/2015</a:t>
             </a:fld>
             <a:endParaRPr lang="en-US" dirty="0"/>
           </a:p>
@@ -7357,7 +7358,7 @@
           <a:p>
             <a:fld id="{48A87A34-81AB-432B-8DAE-1953F412C126}" type="datetimeFigureOut">
               <a:rPr lang="en-US" dirty="0"/>
-              <a:t>9/6/2015</a:t>
+              <a:t>9/8/2015</a:t>
             </a:fld>
             <a:endParaRPr lang="en-US" dirty="0"/>
           </a:p>
@@ -7522,7 +7523,7 @@
           <a:p>
             <a:fld id="{48A87A34-81AB-432B-8DAE-1953F412C126}" type="datetimeFigureOut">
               <a:rPr lang="en-US" dirty="0"/>
-              <a:t>9/6/2015</a:t>
+              <a:t>9/8/2015</a:t>
             </a:fld>
             <a:endParaRPr lang="en-US" dirty="0"/>
           </a:p>
@@ -7697,7 +7698,7 @@
           <a:p>
             <a:fld id="{48A87A34-81AB-432B-8DAE-1953F412C126}" type="datetimeFigureOut">
               <a:rPr lang="en-US" dirty="0"/>
-              <a:t>9/6/2015</a:t>
+              <a:t>9/8/2015</a:t>
             </a:fld>
             <a:endParaRPr lang="en-US" dirty="0"/>
           </a:p>
@@ -7862,7 +7863,7 @@
           <a:p>
             <a:fld id="{48A87A34-81AB-432B-8DAE-1953F412C126}" type="datetimeFigureOut">
               <a:rPr lang="en-US" dirty="0"/>
-              <a:t>9/6/2015</a:t>
+              <a:t>9/8/2015</a:t>
             </a:fld>
             <a:endParaRPr lang="en-US" dirty="0"/>
           </a:p>
@@ -8107,7 +8108,7 @@
           <a:p>
             <a:fld id="{48A87A34-81AB-432B-8DAE-1953F412C126}" type="datetimeFigureOut">
               <a:rPr lang="en-US" dirty="0"/>
-              <a:t>9/6/2015</a:t>
+              <a:t>9/8/2015</a:t>
             </a:fld>
             <a:endParaRPr lang="en-US" dirty="0"/>
           </a:p>
@@ -8334,7 +8335,7 @@
           <a:p>
             <a:fld id="{48A87A34-81AB-432B-8DAE-1953F412C126}" type="datetimeFigureOut">
               <a:rPr lang="en-US" dirty="0"/>
-              <a:t>9/6/2015</a:t>
+              <a:t>9/8/2015</a:t>
             </a:fld>
             <a:endParaRPr lang="en-US" dirty="0"/>
           </a:p>
@@ -8710,7 +8711,7 @@
           <a:p>
             <a:fld id="{48A87A34-81AB-432B-8DAE-1953F412C126}" type="datetimeFigureOut">
               <a:rPr lang="en-US" dirty="0"/>
-              <a:t>9/6/2015</a:t>
+              <a:t>9/8/2015</a:t>
             </a:fld>
             <a:endParaRPr lang="en-US" dirty="0"/>
           </a:p>
@@ -8823,7 +8824,7 @@
           <a:p>
             <a:fld id="{48A87A34-81AB-432B-8DAE-1953F412C126}" type="datetimeFigureOut">
               <a:rPr lang="en-US" dirty="0"/>
-              <a:t>9/6/2015</a:t>
+              <a:t>9/8/2015</a:t>
             </a:fld>
             <a:endParaRPr lang="en-US" dirty="0"/>
           </a:p>
@@ -8913,7 +8914,7 @@
           <a:p>
             <a:fld id="{48A87A34-81AB-432B-8DAE-1953F412C126}" type="datetimeFigureOut">
               <a:rPr lang="en-US" dirty="0"/>
-              <a:t>9/6/2015</a:t>
+              <a:t>9/8/2015</a:t>
             </a:fld>
             <a:endParaRPr lang="en-US" dirty="0"/>
           </a:p>
@@ -9157,7 +9158,7 @@
           <a:p>
             <a:fld id="{48A87A34-81AB-432B-8DAE-1953F412C126}" type="datetimeFigureOut">
               <a:rPr lang="en-US" dirty="0"/>
-              <a:t>9/6/2015</a:t>
+              <a:t>9/8/2015</a:t>
             </a:fld>
             <a:endParaRPr lang="en-US" dirty="0"/>
           </a:p>
@@ -9432,7 +9433,7 @@
           <a:p>
             <a:fld id="{48A87A34-81AB-432B-8DAE-1953F412C126}" type="datetimeFigureOut">
               <a:rPr lang="en-US" dirty="0"/>
-              <a:t>9/6/2015</a:t>
+              <a:t>9/8/2015</a:t>
             </a:fld>
             <a:endParaRPr lang="en-US" dirty="0"/>
           </a:p>
@@ -9550,7 +9551,7 @@
           <a:noFill/>
           <a:extLst>
             <a:ext uri="{909E8E84-426E-40dd-AFC4-6F175D3DCCD1}">
-              <a14:hiddenFill xmlns="" xmlns:a14="http://schemas.microsoft.com/office/drawing/2010/main">
+              <a14:hiddenFill xmlns:a14="http://schemas.microsoft.com/office/drawing/2010/main" xmlns="">
                 <a:solidFill>
                   <a:srgbClr val="FFFFFF"/>
                 </a:solidFill>
@@ -9624,7 +9625,7 @@
               </a:ln>
               <a:extLst>
                 <a:ext uri="{91240B29-F687-4f45-9708-019B960494DF}">
-                  <a14:hiddenLine xmlns="" xmlns:a14="http://schemas.microsoft.com/office/drawing/2010/main" w="9525">
+                  <a14:hiddenLine xmlns:a14="http://schemas.microsoft.com/office/drawing/2010/main" xmlns="" w="9525">
                     <a:solidFill>
                       <a:srgbClr val="000000"/>
                     </a:solidFill>
@@ -9714,7 +9715,7 @@
               </a:ln>
               <a:extLst>
                 <a:ext uri="{91240B29-F687-4f45-9708-019B960494DF}">
-                  <a14:hiddenLine xmlns="" xmlns:a14="http://schemas.microsoft.com/office/drawing/2010/main" w="9525">
+                  <a14:hiddenLine xmlns:a14="http://schemas.microsoft.com/office/drawing/2010/main" xmlns="" w="9525">
                     <a:solidFill>
                       <a:srgbClr val="000000"/>
                     </a:solidFill>
@@ -9804,7 +9805,7 @@
               </a:ln>
               <a:extLst>
                 <a:ext uri="{91240B29-F687-4f45-9708-019B960494DF}">
-                  <a14:hiddenLine xmlns="" xmlns:a14="http://schemas.microsoft.com/office/drawing/2010/main" w="9525">
+                  <a14:hiddenLine xmlns:a14="http://schemas.microsoft.com/office/drawing/2010/main" xmlns="" w="9525">
                     <a:solidFill>
                       <a:srgbClr val="000000"/>
                     </a:solidFill>
@@ -9866,7 +9867,7 @@
               </a:ln>
               <a:extLst>
                 <a:ext uri="{91240B29-F687-4f45-9708-019B960494DF}">
-                  <a14:hiddenLine xmlns="" xmlns:a14="http://schemas.microsoft.com/office/drawing/2010/main" w="9525">
+                  <a14:hiddenLine xmlns:a14="http://schemas.microsoft.com/office/drawing/2010/main" xmlns="" w="9525">
                     <a:solidFill>
                       <a:srgbClr val="000000"/>
                     </a:solidFill>
@@ -9956,7 +9957,7 @@
               </a:ln>
               <a:extLst>
                 <a:ext uri="{91240B29-F687-4f45-9708-019B960494DF}">
-                  <a14:hiddenLine xmlns="" xmlns:a14="http://schemas.microsoft.com/office/drawing/2010/main" w="9525">
+                  <a14:hiddenLine xmlns:a14="http://schemas.microsoft.com/office/drawing/2010/main" xmlns="" w="9525">
                     <a:solidFill>
                       <a:srgbClr val="000000"/>
                     </a:solidFill>
@@ -10018,7 +10019,7 @@
               </a:ln>
               <a:extLst>
                 <a:ext uri="{91240B29-F687-4f45-9708-019B960494DF}">
-                  <a14:hiddenLine xmlns="" xmlns:a14="http://schemas.microsoft.com/office/drawing/2010/main" w="9525">
+                  <a14:hiddenLine xmlns:a14="http://schemas.microsoft.com/office/drawing/2010/main" xmlns="" w="9525">
                     <a:solidFill>
                       <a:srgbClr val="000000"/>
                     </a:solidFill>
@@ -10080,7 +10081,7 @@
               </a:ln>
               <a:extLst>
                 <a:ext uri="{91240B29-F687-4f45-9708-019B960494DF}">
-                  <a14:hiddenLine xmlns="" xmlns:a14="http://schemas.microsoft.com/office/drawing/2010/main" w="9525">
+                  <a14:hiddenLine xmlns:a14="http://schemas.microsoft.com/office/drawing/2010/main" xmlns="" w="9525">
                     <a:solidFill>
                       <a:srgbClr val="000000"/>
                     </a:solidFill>
@@ -10170,7 +10171,7 @@
               </a:ln>
               <a:extLst>
                 <a:ext uri="{91240B29-F687-4f45-9708-019B960494DF}">
-                  <a14:hiddenLine xmlns="" xmlns:a14="http://schemas.microsoft.com/office/drawing/2010/main" w="9525">
+                  <a14:hiddenLine xmlns:a14="http://schemas.microsoft.com/office/drawing/2010/main" xmlns="" w="9525">
                     <a:solidFill>
                       <a:srgbClr val="000000"/>
                     </a:solidFill>
@@ -10260,7 +10261,7 @@
               </a:ln>
               <a:extLst>
                 <a:ext uri="{91240B29-F687-4f45-9708-019B960494DF}">
-                  <a14:hiddenLine xmlns="" xmlns:a14="http://schemas.microsoft.com/office/drawing/2010/main" w="9525">
+                  <a14:hiddenLine xmlns:a14="http://schemas.microsoft.com/office/drawing/2010/main" xmlns="" w="9525">
                     <a:solidFill>
                       <a:srgbClr val="000000"/>
                     </a:solidFill>
@@ -10322,7 +10323,7 @@
               </a:ln>
               <a:extLst>
                 <a:ext uri="{91240B29-F687-4f45-9708-019B960494DF}">
-                  <a14:hiddenLine xmlns="" xmlns:a14="http://schemas.microsoft.com/office/drawing/2010/main" w="9525">
+                  <a14:hiddenLine xmlns:a14="http://schemas.microsoft.com/office/drawing/2010/main" xmlns="" w="9525">
                     <a:solidFill>
                       <a:srgbClr val="000000"/>
                     </a:solidFill>
@@ -10432,7 +10433,7 @@
               </a:ln>
               <a:extLst>
                 <a:ext uri="{91240B29-F687-4f45-9708-019B960494DF}">
-                  <a14:hiddenLine xmlns="" xmlns:a14="http://schemas.microsoft.com/office/drawing/2010/main" w="9525">
+                  <a14:hiddenLine xmlns:a14="http://schemas.microsoft.com/office/drawing/2010/main" xmlns="" w="9525">
                     <a:solidFill>
                       <a:srgbClr val="000000"/>
                     </a:solidFill>
@@ -10516,7 +10517,7 @@
               </a:ln>
               <a:extLst>
                 <a:ext uri="{91240B29-F687-4f45-9708-019B960494DF}">
-                  <a14:hiddenLine xmlns="" xmlns:a14="http://schemas.microsoft.com/office/drawing/2010/main" w="9525">
+                  <a14:hiddenLine xmlns:a14="http://schemas.microsoft.com/office/drawing/2010/main" xmlns="" w="9525">
                     <a:solidFill>
                       <a:srgbClr val="000000"/>
                     </a:solidFill>
@@ -10578,7 +10579,7 @@
               </a:ln>
               <a:extLst>
                 <a:ext uri="{91240B29-F687-4f45-9708-019B960494DF}">
-                  <a14:hiddenLine xmlns="" xmlns:a14="http://schemas.microsoft.com/office/drawing/2010/main" w="9525">
+                  <a14:hiddenLine xmlns:a14="http://schemas.microsoft.com/office/drawing/2010/main" xmlns="" w="9525">
                     <a:solidFill>
                       <a:srgbClr val="000000"/>
                     </a:solidFill>
@@ -10640,7 +10641,7 @@
               </a:ln>
               <a:extLst>
                 <a:ext uri="{91240B29-F687-4f45-9708-019B960494DF}">
-                  <a14:hiddenLine xmlns="" xmlns:a14="http://schemas.microsoft.com/office/drawing/2010/main" w="9525">
+                  <a14:hiddenLine xmlns:a14="http://schemas.microsoft.com/office/drawing/2010/main" xmlns="" w="9525">
                     <a:solidFill>
                       <a:srgbClr val="000000"/>
                     </a:solidFill>
@@ -10730,7 +10731,7 @@
               </a:ln>
               <a:extLst>
                 <a:ext uri="{91240B29-F687-4f45-9708-019B960494DF}">
-                  <a14:hiddenLine xmlns="" xmlns:a14="http://schemas.microsoft.com/office/drawing/2010/main" w="9525">
+                  <a14:hiddenLine xmlns:a14="http://schemas.microsoft.com/office/drawing/2010/main" xmlns="" w="9525">
                     <a:solidFill>
                       <a:srgbClr val="000000"/>
                     </a:solidFill>
@@ -10764,7 +10765,7 @@
               </a:ln>
               <a:extLst>
                 <a:ext uri="{91240B29-F687-4f45-9708-019B960494DF}">
-                  <a14:hiddenLine xmlns="" xmlns:a14="http://schemas.microsoft.com/office/drawing/2010/main" w="9525">
+                  <a14:hiddenLine xmlns:a14="http://schemas.microsoft.com/office/drawing/2010/main" xmlns="" w="9525">
                     <a:solidFill>
                       <a:srgbClr val="000000"/>
                     </a:solidFill>
@@ -10829,7 +10830,7 @@
               </a:ln>
               <a:extLst>
                 <a:ext uri="{91240B29-F687-4f45-9708-019B960494DF}">
-                  <a14:hiddenLine xmlns="" xmlns:a14="http://schemas.microsoft.com/office/drawing/2010/main" w="9525">
+                  <a14:hiddenLine xmlns:a14="http://schemas.microsoft.com/office/drawing/2010/main" xmlns="" w="9525">
                     <a:solidFill>
                       <a:srgbClr val="000000"/>
                     </a:solidFill>
@@ -10919,7 +10920,7 @@
               </a:ln>
               <a:extLst>
                 <a:ext uri="{91240B29-F687-4f45-9708-019B960494DF}">
-                  <a14:hiddenLine xmlns="" xmlns:a14="http://schemas.microsoft.com/office/drawing/2010/main" w="9525">
+                  <a14:hiddenLine xmlns:a14="http://schemas.microsoft.com/office/drawing/2010/main" xmlns="" w="9525">
                     <a:solidFill>
                       <a:srgbClr val="000000"/>
                     </a:solidFill>
@@ -10981,7 +10982,7 @@
               </a:ln>
               <a:extLst>
                 <a:ext uri="{91240B29-F687-4f45-9708-019B960494DF}">
-                  <a14:hiddenLine xmlns="" xmlns:a14="http://schemas.microsoft.com/office/drawing/2010/main" w="9525">
+                  <a14:hiddenLine xmlns:a14="http://schemas.microsoft.com/office/drawing/2010/main" xmlns="" w="9525">
                     <a:solidFill>
                       <a:srgbClr val="000000"/>
                     </a:solidFill>
@@ -11071,7 +11072,7 @@
               </a:ln>
               <a:extLst>
                 <a:ext uri="{91240B29-F687-4f45-9708-019B960494DF}">
-                  <a14:hiddenLine xmlns="" xmlns:a14="http://schemas.microsoft.com/office/drawing/2010/main" w="9525">
+                  <a14:hiddenLine xmlns:a14="http://schemas.microsoft.com/office/drawing/2010/main" xmlns="" w="9525">
                     <a:solidFill>
                       <a:srgbClr val="000000"/>
                     </a:solidFill>
@@ -11136,7 +11137,7 @@
               </a:ln>
               <a:extLst>
                 <a:ext uri="{91240B29-F687-4f45-9708-019B960494DF}">
-                  <a14:hiddenLine xmlns="" xmlns:a14="http://schemas.microsoft.com/office/drawing/2010/main" w="9525">
+                  <a14:hiddenLine xmlns:a14="http://schemas.microsoft.com/office/drawing/2010/main" xmlns="" w="9525">
                     <a:solidFill>
                       <a:srgbClr val="000000"/>
                     </a:solidFill>
@@ -11198,7 +11199,7 @@
               </a:ln>
               <a:extLst>
                 <a:ext uri="{91240B29-F687-4f45-9708-019B960494DF}">
-                  <a14:hiddenLine xmlns="" xmlns:a14="http://schemas.microsoft.com/office/drawing/2010/main" w="9525">
+                  <a14:hiddenLine xmlns:a14="http://schemas.microsoft.com/office/drawing/2010/main" xmlns="" w="9525">
                     <a:solidFill>
                       <a:srgbClr val="000000"/>
                     </a:solidFill>
@@ -11288,7 +11289,7 @@
               </a:ln>
               <a:extLst>
                 <a:ext uri="{91240B29-F687-4f45-9708-019B960494DF}">
-                  <a14:hiddenLine xmlns="" xmlns:a14="http://schemas.microsoft.com/office/drawing/2010/main" w="9525">
+                  <a14:hiddenLine xmlns:a14="http://schemas.microsoft.com/office/drawing/2010/main" xmlns="" w="9525">
                     <a:solidFill>
                       <a:srgbClr val="000000"/>
                     </a:solidFill>
@@ -11378,7 +11379,7 @@
               </a:ln>
               <a:extLst>
                 <a:ext uri="{91240B29-F687-4f45-9708-019B960494DF}">
-                  <a14:hiddenLine xmlns="" xmlns:a14="http://schemas.microsoft.com/office/drawing/2010/main" w="9525">
+                  <a14:hiddenLine xmlns:a14="http://schemas.microsoft.com/office/drawing/2010/main" xmlns="" w="9525">
                     <a:solidFill>
                       <a:srgbClr val="000000"/>
                     </a:solidFill>
@@ -11443,7 +11444,7 @@
               </a:ln>
               <a:extLst>
                 <a:ext uri="{91240B29-F687-4f45-9708-019B960494DF}">
-                  <a14:hiddenLine xmlns="" xmlns:a14="http://schemas.microsoft.com/office/drawing/2010/main" w="9525">
+                  <a14:hiddenLine xmlns:a14="http://schemas.microsoft.com/office/drawing/2010/main" xmlns="" w="9525">
                     <a:solidFill>
                       <a:srgbClr val="000000"/>
                     </a:solidFill>
@@ -11563,7 +11564,7 @@
               </a:ln>
               <a:extLst>
                 <a:ext uri="{91240B29-F687-4f45-9708-019B960494DF}">
-                  <a14:hiddenLine xmlns="" xmlns:a14="http://schemas.microsoft.com/office/drawing/2010/main" w="9525">
+                  <a14:hiddenLine xmlns:a14="http://schemas.microsoft.com/office/drawing/2010/main" xmlns="" w="9525">
                     <a:solidFill>
                       <a:srgbClr val="000000"/>
                     </a:solidFill>
@@ -11644,7 +11645,7 @@
               </a:ln>
               <a:extLst>
                 <a:ext uri="{91240B29-F687-4f45-9708-019B960494DF}">
-                  <a14:hiddenLine xmlns="" xmlns:a14="http://schemas.microsoft.com/office/drawing/2010/main" w="9525">
+                  <a14:hiddenLine xmlns:a14="http://schemas.microsoft.com/office/drawing/2010/main" xmlns="" w="9525">
                     <a:solidFill>
                       <a:srgbClr val="000000"/>
                     </a:solidFill>
@@ -11759,7 +11760,7 @@
               </a:ln>
               <a:extLst>
                 <a:ext uri="{91240B29-F687-4f45-9708-019B960494DF}">
-                  <a14:hiddenLine xmlns="" xmlns:a14="http://schemas.microsoft.com/office/drawing/2010/main" w="9525">
+                  <a14:hiddenLine xmlns:a14="http://schemas.microsoft.com/office/drawing/2010/main" xmlns="" w="9525">
                     <a:solidFill>
                       <a:srgbClr val="000000"/>
                     </a:solidFill>
@@ -11849,7 +11850,7 @@
               </a:ln>
               <a:extLst>
                 <a:ext uri="{91240B29-F687-4f45-9708-019B960494DF}">
-                  <a14:hiddenLine xmlns="" xmlns:a14="http://schemas.microsoft.com/office/drawing/2010/main" w="9525">
+                  <a14:hiddenLine xmlns:a14="http://schemas.microsoft.com/office/drawing/2010/main" xmlns="" w="9525">
                     <a:solidFill>
                       <a:srgbClr val="000000"/>
                     </a:solidFill>
@@ -11914,7 +11915,7 @@
               </a:ln>
               <a:extLst>
                 <a:ext uri="{91240B29-F687-4f45-9708-019B960494DF}">
-                  <a14:hiddenLine xmlns="" xmlns:a14="http://schemas.microsoft.com/office/drawing/2010/main" w="9525">
+                  <a14:hiddenLine xmlns:a14="http://schemas.microsoft.com/office/drawing/2010/main" xmlns="" w="9525">
                     <a:solidFill>
                       <a:srgbClr val="000000"/>
                     </a:solidFill>
@@ -12004,7 +12005,7 @@
               </a:ln>
               <a:extLst>
                 <a:ext uri="{91240B29-F687-4f45-9708-019B960494DF}">
-                  <a14:hiddenLine xmlns="" xmlns:a14="http://schemas.microsoft.com/office/drawing/2010/main" w="9525">
+                  <a14:hiddenLine xmlns:a14="http://schemas.microsoft.com/office/drawing/2010/main" xmlns="" w="9525">
                     <a:solidFill>
                       <a:srgbClr val="000000"/>
                     </a:solidFill>
@@ -12072,7 +12073,7 @@
               </a:ln>
               <a:extLst>
                 <a:ext uri="{91240B29-F687-4f45-9708-019B960494DF}">
-                  <a14:hiddenLine xmlns="" xmlns:a14="http://schemas.microsoft.com/office/drawing/2010/main" w="9525">
+                  <a14:hiddenLine xmlns:a14="http://schemas.microsoft.com/office/drawing/2010/main" xmlns="" w="9525">
                     <a:solidFill>
                       <a:srgbClr val="000000"/>
                     </a:solidFill>
@@ -12162,7 +12163,7 @@
               </a:ln>
               <a:extLst>
                 <a:ext uri="{91240B29-F687-4f45-9708-019B960494DF}">
-                  <a14:hiddenLine xmlns="" xmlns:a14="http://schemas.microsoft.com/office/drawing/2010/main" w="9525">
+                  <a14:hiddenLine xmlns:a14="http://schemas.microsoft.com/office/drawing/2010/main" xmlns="" w="9525">
                     <a:solidFill>
                       <a:srgbClr val="000000"/>
                     </a:solidFill>
@@ -12230,7 +12231,7 @@
               </a:ln>
               <a:extLst>
                 <a:ext uri="{91240B29-F687-4f45-9708-019B960494DF}">
-                  <a14:hiddenLine xmlns="" xmlns:a14="http://schemas.microsoft.com/office/drawing/2010/main" w="9525">
+                  <a14:hiddenLine xmlns:a14="http://schemas.microsoft.com/office/drawing/2010/main" xmlns="" w="9525">
                     <a:solidFill>
                       <a:srgbClr val="000000"/>
                     </a:solidFill>
@@ -12320,7 +12321,7 @@
               </a:ln>
               <a:extLst>
                 <a:ext uri="{91240B29-F687-4f45-9708-019B960494DF}">
-                  <a14:hiddenLine xmlns="" xmlns:a14="http://schemas.microsoft.com/office/drawing/2010/main" w="9525">
+                  <a14:hiddenLine xmlns:a14="http://schemas.microsoft.com/office/drawing/2010/main" xmlns="" w="9525">
                     <a:solidFill>
                       <a:srgbClr val="000000"/>
                     </a:solidFill>
@@ -12354,7 +12355,7 @@
               </a:ln>
               <a:extLst>
                 <a:ext uri="{91240B29-F687-4f45-9708-019B960494DF}">
-                  <a14:hiddenLine xmlns="" xmlns:a14="http://schemas.microsoft.com/office/drawing/2010/main" w="9525">
+                  <a14:hiddenLine xmlns:a14="http://schemas.microsoft.com/office/drawing/2010/main" xmlns="" w="9525">
                     <a:solidFill>
                       <a:srgbClr val="000000"/>
                     </a:solidFill>
@@ -12495,7 +12496,7 @@
             <a:fld id="{48A87A34-81AB-432B-8DAE-1953F412C126}" type="datetimeFigureOut">
               <a:rPr lang="en-US" dirty="0"/>
               <a:pPr/>
-              <a:t>9/6/2015</a:t>
+              <a:t>9/8/2015</a:t>
             </a:fld>
             <a:endParaRPr lang="en-US" dirty="0"/>
           </a:p>
@@ -12944,7 +12945,12 @@
             <p:ph type="subTitle" idx="1"/>
           </p:nvPr>
         </p:nvSpPr>
-        <p:spPr/>
+        <p:spPr>
+          <a:xfrm>
+            <a:off x="1876424" y="3602037"/>
+            <a:ext cx="8791575" cy="3081395"/>
+          </a:xfrm>
+        </p:spPr>
         <p:txBody>
           <a:bodyPr>
             <a:normAutofit fontScale="92500" lnSpcReduction="20000"/>
@@ -12971,12 +12977,93 @@
           <a:p>
             <a:r>
               <a:rPr lang="en-US" dirty="0" smtClean="0"/>
-              <a:t>How to use it</a:t>
+              <a:t>How to use </a:t>
+            </a:r>
+            <a:r>
+              <a:rPr lang="en-US" dirty="0" smtClean="0"/>
+              <a:t>it</a:t>
+            </a:r>
+          </a:p>
+          <a:p>
+            <a:endParaRPr lang="en-US" dirty="0" smtClean="0"/>
+          </a:p>
+          <a:p>
+            <a:r>
+              <a:rPr lang="en-US" dirty="0">
+                <a:hlinkClick r:id="rId2"/>
+              </a:rPr>
+              <a:t>https://</a:t>
+            </a:r>
+            <a:r>
+              <a:rPr lang="en-US" dirty="0" smtClean="0">
+                <a:hlinkClick r:id="rId2"/>
+              </a:rPr>
+              <a:t>github.com/alexschneider/sample-threat-model</a:t>
+            </a:r>
+            <a:endParaRPr lang="en-US" dirty="0" smtClean="0"/>
+          </a:p>
+          <a:p>
+            <a:r>
+              <a:rPr lang="en-US" dirty="0">
+                <a:hlinkClick r:id="rId3"/>
+              </a:rPr>
+              <a:t>http://</a:t>
+            </a:r>
+            <a:r>
+              <a:rPr lang="en-US" dirty="0" smtClean="0">
+                <a:hlinkClick r:id="rId3"/>
+              </a:rPr>
+              <a:t>is.gd/EY9sna</a:t>
+            </a:r>
+            <a:r>
+              <a:rPr lang="en-US" dirty="0" smtClean="0"/>
+              <a:t> </a:t>
             </a:r>
             <a:endParaRPr lang="en-US" dirty="0"/>
           </a:p>
         </p:txBody>
       </p:sp>
+      <p:pic>
+        <p:nvPicPr>
+          <p:cNvPr id="1026" name="Picture 2" descr="QR code"/>
+          <p:cNvPicPr>
+            <a:picLocks noChangeAspect="1" noChangeArrowheads="1"/>
+          </p:cNvPicPr>
+          <p:nvPr/>
+        </p:nvPicPr>
+        <p:blipFill>
+          <a:blip r:embed="rId4">
+            <a:extLst>
+              <a:ext uri="{28A0092B-C50C-407E-A947-70E740481C1C}">
+                <a14:useLocalDpi xmlns:a14="http://schemas.microsoft.com/office/drawing/2010/main" val="0"/>
+              </a:ext>
+            </a:extLst>
+          </a:blip>
+          <a:srcRect/>
+          <a:stretch>
+            <a:fillRect/>
+          </a:stretch>
+        </p:blipFill>
+        <p:spPr bwMode="auto">
+          <a:xfrm>
+            <a:off x="9617695" y="4353339"/>
+            <a:ext cx="2100608" cy="2100608"/>
+          </a:xfrm>
+          <a:prstGeom prst="rect">
+            <a:avLst/>
+          </a:prstGeom>
+          <a:noFill/>
+          <a:extLst>
+            <a:ext uri="{909E8E84-426E-40DD-AFC4-6F175D3DCCD1}">
+              <a14:hiddenFill xmlns:a14="http://schemas.microsoft.com/office/drawing/2010/main">
+                <a:solidFill>
+                  <a:srgbClr val="FFFFFF"/>
+                </a:solidFill>
+              </a14:hiddenFill>
+            </a:ext>
+          </a:extLst>
+        </p:spPr>
+      </p:pic>
     </p:spTree>
     <p:extLst>
       <p:ext uri="{BB962C8B-B14F-4D97-AF65-F5344CB8AC3E}">
@@ -13031,11 +13118,7 @@
           <a:p>
             <a:r>
               <a:rPr lang="en-US" dirty="0" smtClean="0"/>
-              <a:t>Identifying </a:t>
-            </a:r>
-            <a:r>
-              <a:rPr lang="en-US" dirty="0" smtClean="0"/>
-              <a:t>Threats And possible vulnerabilities</a:t>
+              <a:t>Identify possible attackers</a:t>
             </a:r>
             <a:endParaRPr lang="en-US" dirty="0"/>
           </a:p>
@@ -13054,93 +13137,61 @@
         <p:spPr/>
         <p:txBody>
           <a:bodyPr>
-            <a:normAutofit fontScale="70000" lnSpcReduction="20000"/>
+            <a:normAutofit/>
           </a:bodyPr>
           <a:lstStyle/>
           <a:p>
             <a:r>
               <a:rPr lang="en-US" dirty="0" smtClean="0"/>
-              <a:t>Every asset should have one or more of these</a:t>
+              <a:t>Who will be attacking the application and why? What level of security will the application need and what are the consequences of attacks</a:t>
             </a:r>
           </a:p>
           <a:p>
             <a:r>
               <a:rPr lang="en-US" dirty="0" smtClean="0"/>
-              <a:t>Start out with a statement: An attacker can &lt;x&gt;</a:t>
+              <a:t>Examples: </a:t>
             </a:r>
           </a:p>
           <a:p>
             <a:pPr lvl="1"/>
             <a:r>
               <a:rPr lang="en-US" dirty="0" smtClean="0"/>
-              <a:t>E.G. An attacker can read PII</a:t>
-            </a:r>
-          </a:p>
-          <a:p>
+              <a:t>Online games have hackers who want to gain an unfair advantage – Low </a:t>
+            </a:r>
+            <a:endParaRPr lang="en-US" dirty="0"/>
+          </a:p>
+          <a:p>
+            <a:pPr lvl="1"/>
+            <a:r>
+              <a:rPr lang="en-US" dirty="0"/>
+              <a:t>E-commerce sites have credit card data which criminals can </a:t>
+            </a:r>
             <a:r>
               <a:rPr lang="en-US" dirty="0" smtClean="0"/>
-              <a:t>How? Explain what the attacker will do (there may be multiple ways).</a:t>
+              <a:t>use </a:t>
+            </a:r>
+            <a:r>
+              <a:rPr lang="en-US" dirty="0"/>
+              <a:t>or </a:t>
+            </a:r>
+            <a:r>
+              <a:rPr lang="en-US" dirty="0" smtClean="0"/>
+              <a:t>sell – Medium </a:t>
             </a:r>
           </a:p>
           <a:p>
             <a:pPr lvl="1"/>
             <a:r>
-              <a:rPr lang="en-US" b="1" dirty="0" smtClean="0"/>
-              <a:t>Hint</a:t>
-            </a:r>
-            <a:r>
               <a:rPr lang="en-US" dirty="0" smtClean="0"/>
-              <a:t>: most of these are going to come from the OWASP Top 10 list: </a:t>
-            </a:r>
-            <a:r>
-              <a:rPr lang="en-US" dirty="0">
-                <a:hlinkClick r:id="rId2"/>
-              </a:rPr>
-              <a:t>https://</a:t>
-            </a:r>
-            <a:r>
-              <a:rPr lang="en-US" dirty="0" smtClean="0">
-                <a:hlinkClick r:id="rId2"/>
-              </a:rPr>
-              <a:t>www.owasp.org/index.php/Top_10_2013-Top_10</a:t>
-            </a:r>
-            <a:r>
-              <a:rPr lang="en-US" dirty="0" smtClean="0"/>
-              <a:t> - try to anticipate vulnerabilities from as many of the top 10 as possible</a:t>
-            </a:r>
+              <a:t>Encrypted messaging services have federal governments who want to read the contents of the messages sent – High </a:t>
+            </a:r>
+          </a:p>
+          <a:p>
+            <a:pPr lvl="1"/>
             <a:endParaRPr lang="en-US" dirty="0" smtClean="0"/>
           </a:p>
           <a:p>
             <a:pPr lvl="1"/>
-            <a:r>
-              <a:rPr lang="en-US" dirty="0" smtClean="0"/>
-              <a:t>Examples:</a:t>
-            </a:r>
-          </a:p>
-          <a:p>
-            <a:pPr lvl="2"/>
-            <a:r>
-              <a:rPr lang="en-US" dirty="0" smtClean="0"/>
-              <a:t>Because data is invalidated improperly on user input, an attacker can inject SQL commands to dump the database (A1-Injection)</a:t>
-            </a:r>
-          </a:p>
-          <a:p>
-            <a:pPr lvl="2"/>
-            <a:r>
-              <a:rPr lang="en-US" dirty="0" smtClean="0"/>
-              <a:t>The application doesn’t properly authenticate users, so an attacker can log in as another user and access their data (A2-Broken Authentication and Session Management)</a:t>
-            </a:r>
-          </a:p>
-          <a:p>
-            <a:r>
-              <a:rPr lang="en-US" dirty="0" smtClean="0"/>
-              <a:t>One thing to keep in mind is how the users are broken up in roles and which assets can be CRUD by which roles (created, read, updated, or deleted)</a:t>
-            </a:r>
-          </a:p>
-          <a:p>
-            <a:pPr marL="0" indent="0">
-              <a:buNone/>
-            </a:pPr>
             <a:endParaRPr lang="en-US" dirty="0"/>
           </a:p>
         </p:txBody>
@@ -13148,7 +13199,7 @@
     </p:spTree>
     <p:extLst>
       <p:ext uri="{BB962C8B-B14F-4D97-AF65-F5344CB8AC3E}">
-        <p14:creationId xmlns:p14="http://schemas.microsoft.com/office/powerpoint/2010/main" val="3741298789"/>
+        <p14:creationId xmlns:p14="http://schemas.microsoft.com/office/powerpoint/2010/main" val="268462443"/>
       </p:ext>
     </p:extLst>
   </p:cSld>
@@ -13199,7 +13250,7 @@
           <a:p>
             <a:r>
               <a:rPr lang="en-US" dirty="0" smtClean="0"/>
-              <a:t>Identify countermeasures</a:t>
+              <a:t>Identifying Threats And possible vulnerabilities</a:t>
             </a:r>
             <a:endParaRPr lang="en-US" dirty="0"/>
           </a:p>
@@ -13218,74 +13269,100 @@
         <p:spPr/>
         <p:txBody>
           <a:bodyPr>
-            <a:normAutofit fontScale="77500" lnSpcReduction="20000"/>
+            <a:normAutofit fontScale="70000" lnSpcReduction="20000"/>
           </a:bodyPr>
           <a:lstStyle/>
           <a:p>
             <a:r>
               <a:rPr lang="en-US" dirty="0" smtClean="0"/>
-              <a:t>Every vulnerability must have a countermeasure – usually implemented in code, but not always (it can be a procedure or an operating system change)</a:t>
+              <a:t>Every asset should have one or more of these</a:t>
             </a:r>
           </a:p>
           <a:p>
             <a:r>
               <a:rPr lang="en-US" dirty="0" smtClean="0"/>
-              <a:t>Some of these can be pretty vague and that’s OK (though the more specific it is, the easier down the road)</a:t>
-            </a:r>
-          </a:p>
-          <a:p>
+              <a:t>Start out with a statement: An attacker can &lt;x&gt;</a:t>
+            </a:r>
+          </a:p>
+          <a:p>
+            <a:pPr lvl="1"/>
             <a:r>
               <a:rPr lang="en-US" dirty="0" smtClean="0"/>
-              <a:t>Countermeasures for the two attacks we had:</a:t>
+              <a:t>E.G. An attacker can read PII</a:t>
+            </a:r>
+          </a:p>
+          <a:p>
+            <a:r>
+              <a:rPr lang="en-US" dirty="0" smtClean="0"/>
+              <a:t>How? Explain what the attacker will do (there may be multiple ways).</a:t>
             </a:r>
           </a:p>
           <a:p>
             <a:pPr lvl="1"/>
             <a:r>
-              <a:rPr lang="en-US" dirty="0"/>
-              <a:t>Because data is invalidated improperly on user input, an attacker can inject SQL commands to dump the database (A1-Injection</a:t>
+              <a:rPr lang="en-US" b="1" dirty="0" smtClean="0"/>
+              <a:t>Hint</a:t>
             </a:r>
             <a:r>
               <a:rPr lang="en-US" dirty="0" smtClean="0"/>
-              <a:t>)</a:t>
+              <a:t>: most of these are going to come from the OWASP Top 10 list: </a:t>
+            </a:r>
+            <a:r>
+              <a:rPr lang="en-US" dirty="0">
+                <a:hlinkClick r:id="rId2"/>
+              </a:rPr>
+              <a:t>https://</a:t>
+            </a:r>
+            <a:r>
+              <a:rPr lang="en-US" dirty="0" smtClean="0">
+                <a:hlinkClick r:id="rId2"/>
+              </a:rPr>
+              <a:t>www.owasp.org/index.php/Top_10_2013-Top_10</a:t>
+            </a:r>
+            <a:r>
+              <a:rPr lang="en-US" dirty="0" smtClean="0"/>
+              <a:t> - try to anticipate vulnerabilities from as many of the top 10 as possible</a:t>
+            </a:r>
+          </a:p>
+          <a:p>
+            <a:pPr lvl="1"/>
+            <a:r>
+              <a:rPr lang="en-US" dirty="0" smtClean="0"/>
+              <a:t>Examples:</a:t>
             </a:r>
           </a:p>
           <a:p>
             <a:pPr lvl="2"/>
             <a:r>
               <a:rPr lang="en-US" dirty="0" smtClean="0"/>
-              <a:t>Use an ORM and/or ensure all queries relying on user input are parameterized or prepared statements</a:t>
-            </a:r>
+              <a:t>Because data is invalidated improperly on user input, an attacker can inject SQL commands to dump the database (A1-Injection)</a:t>
+            </a:r>
+          </a:p>
+          <a:p>
+            <a:pPr lvl="2"/>
+            <a:r>
+              <a:rPr lang="en-US" dirty="0" smtClean="0"/>
+              <a:t>The application doesn’t properly authenticate users, so an attacker can log in as another user and access their data (A2-Broken Authentication and Session Management)</a:t>
+            </a:r>
+          </a:p>
+          <a:p>
+            <a:r>
+              <a:rPr lang="en-US" dirty="0" smtClean="0"/>
+              <a:t>One thing to keep in mind is how the users are broken up in roles and which assets can be CRUD by which roles (created, read, updated, or deleted)</a:t>
+            </a:r>
+          </a:p>
+          <a:p>
+            <a:pPr marL="0" indent="0">
+              <a:buNone/>
+            </a:pPr>
             <a:endParaRPr lang="en-US" dirty="0"/>
-          </a:p>
-          <a:p>
-            <a:pPr lvl="1"/>
-            <a:r>
-              <a:rPr lang="en-US" dirty="0"/>
-              <a:t>The application doesn’t properly authenticate users, so an attacker can log in as another user and access their data (A2-Broken Authentication and Session Management</a:t>
-            </a:r>
-            <a:r>
-              <a:rPr lang="en-US" dirty="0" smtClean="0"/>
-              <a:t>)</a:t>
-            </a:r>
-          </a:p>
-          <a:p>
-            <a:pPr lvl="2"/>
-            <a:r>
-              <a:rPr lang="en-US" dirty="0" smtClean="0"/>
-              <a:t>Ensure authentication controls exist and restrict access to other user’s data</a:t>
-            </a:r>
-            <a:endParaRPr lang="en-US" dirty="0"/>
-          </a:p>
-          <a:p>
-            <a:endParaRPr lang="en-US" dirty="0" smtClean="0"/>
           </a:p>
         </p:txBody>
       </p:sp>
     </p:spTree>
     <p:extLst>
       <p:ext uri="{BB962C8B-B14F-4D97-AF65-F5344CB8AC3E}">
-        <p14:creationId xmlns:p14="http://schemas.microsoft.com/office/powerpoint/2010/main" val="3818657295"/>
+        <p14:creationId xmlns:p14="http://schemas.microsoft.com/office/powerpoint/2010/main" val="3741298789"/>
       </p:ext>
     </p:extLst>
   </p:cSld>
@@ -13336,7 +13413,7 @@
           <a:p>
             <a:r>
               <a:rPr lang="en-US" dirty="0" smtClean="0"/>
-              <a:t>Implement countermeasures</a:t>
+              <a:t>Identify countermeasures</a:t>
             </a:r>
             <a:endParaRPr lang="en-US" dirty="0"/>
           </a:p>
@@ -13355,55 +13432,74 @@
         <p:spPr/>
         <p:txBody>
           <a:bodyPr>
-            <a:normAutofit fontScale="92500"/>
+            <a:normAutofit fontScale="77500" lnSpcReduction="20000"/>
           </a:bodyPr>
           <a:lstStyle/>
           <a:p>
             <a:r>
               <a:rPr lang="en-US" dirty="0" smtClean="0"/>
-              <a:t>Finally, coding!</a:t>
+              <a:t>Every vulnerability must have a countermeasure – usually implemented in code, but not always (it can be a procedure or an operating system change)</a:t>
             </a:r>
           </a:p>
           <a:p>
             <a:r>
               <a:rPr lang="en-US" dirty="0" smtClean="0"/>
-              <a:t>Many frameworks or libraries will have optional or mandatory countermeasures – make sure they are used properly</a:t>
+              <a:t>Some of these can be pretty vague and that’s OK (though the more specific it is, the easier down the road)</a:t>
+            </a:r>
+          </a:p>
+          <a:p>
+            <a:r>
+              <a:rPr lang="en-US" dirty="0" smtClean="0"/>
+              <a:t>Countermeasures for the two attacks we had:</a:t>
             </a:r>
           </a:p>
           <a:p>
             <a:pPr lvl="1"/>
             <a:r>
+              <a:rPr lang="en-US" dirty="0"/>
+              <a:t>Because data is invalidated improperly on user input, an attacker can inject SQL commands to dump the database (A1-Injection</a:t>
+            </a:r>
+            <a:r>
               <a:rPr lang="en-US" dirty="0" smtClean="0"/>
-              <a:t>However, make sure these frameworks and languages don’t introduce additional vulnerabilities</a:t>
-            </a:r>
-          </a:p>
-          <a:p>
+              <a:t>)</a:t>
+            </a:r>
+          </a:p>
+          <a:p>
+            <a:pPr lvl="2"/>
             <a:r>
               <a:rPr lang="en-US" dirty="0" smtClean="0"/>
-              <a:t>There may already be solutions available that can be plugged into the application</a:t>
-            </a:r>
+              <a:t>Use an ORM and/or ensure all queries relying on user input are parameterized or prepared statements</a:t>
+            </a:r>
+            <a:endParaRPr lang="en-US" dirty="0"/>
           </a:p>
           <a:p>
             <a:pPr lvl="1"/>
             <a:r>
+              <a:rPr lang="en-US" dirty="0"/>
+              <a:t>The application doesn’t properly authenticate users, so an attacker can log in as another user and access their data (A2-Broken Authentication and Session Management</a:t>
+            </a:r>
+            <a:r>
               <a:rPr lang="en-US" dirty="0" smtClean="0"/>
-              <a:t>Middleware for a framework to make things more secure, proxies to reject requests hetaeristically, </a:t>
-            </a:r>
-            <a:r>
-              <a:rPr lang="en-US" dirty="0" err="1" smtClean="0"/>
-              <a:t>etc</a:t>
-            </a:r>
+              <a:t>)</a:t>
+            </a:r>
+          </a:p>
+          <a:p>
+            <a:pPr lvl="2"/>
+            <a:r>
+              <a:rPr lang="en-US" dirty="0" smtClean="0"/>
+              <a:t>Ensure authentication controls exist and restrict access to other user’s data</a:t>
+            </a:r>
+            <a:endParaRPr lang="en-US" dirty="0"/>
+          </a:p>
+          <a:p>
             <a:endParaRPr lang="en-US" dirty="0" smtClean="0"/>
-          </a:p>
-          <a:p>
-            <a:endParaRPr lang="en-US" dirty="0"/>
           </a:p>
         </p:txBody>
       </p:sp>
     </p:spTree>
     <p:extLst>
       <p:ext uri="{BB962C8B-B14F-4D97-AF65-F5344CB8AC3E}">
-        <p14:creationId xmlns:p14="http://schemas.microsoft.com/office/powerpoint/2010/main" val="899743146"/>
+        <p14:creationId xmlns:p14="http://schemas.microsoft.com/office/powerpoint/2010/main" val="3818657295"/>
       </p:ext>
     </p:extLst>
   </p:cSld>
@@ -13454,7 +13550,7 @@
           <a:p>
             <a:r>
               <a:rPr lang="en-US" dirty="0" smtClean="0"/>
-              <a:t>Implementing countermeasures (CONT.)</a:t>
+              <a:t>Implement countermeasures</a:t>
             </a:r>
             <a:endParaRPr lang="en-US" dirty="0"/>
           </a:p>
@@ -13472,27 +13568,48 @@
         </p:nvSpPr>
         <p:spPr/>
         <p:txBody>
-          <a:bodyPr/>
+          <a:bodyPr>
+            <a:normAutofit fontScale="92500"/>
+          </a:bodyPr>
           <a:lstStyle/>
           <a:p>
             <a:r>
               <a:rPr lang="en-US" dirty="0" smtClean="0"/>
-              <a:t>While coding the application</a:t>
+              <a:t>Finally, coding!</a:t>
+            </a:r>
+          </a:p>
+          <a:p>
+            <a:r>
+              <a:rPr lang="en-US" dirty="0" smtClean="0"/>
+              <a:t>Many frameworks or libraries will have optional or mandatory countermeasures – make sure they are used properly</a:t>
             </a:r>
           </a:p>
           <a:p>
             <a:pPr lvl="1"/>
             <a:r>
               <a:rPr lang="en-US" dirty="0" smtClean="0"/>
-              <a:t>Refer back to threat model to make sure assets are protected</a:t>
+              <a:t>However, make sure these frameworks and languages don’t introduce additional vulnerabilities</a:t>
+            </a:r>
+          </a:p>
+          <a:p>
+            <a:r>
+              <a:rPr lang="en-US" dirty="0" smtClean="0"/>
+              <a:t>There may already be solutions available that can be plugged into the application</a:t>
             </a:r>
           </a:p>
           <a:p>
             <a:pPr lvl="1"/>
             <a:r>
               <a:rPr lang="en-US" dirty="0" smtClean="0"/>
-              <a:t>Update the threat model to reflect new attacks vectors, changes in assets or roles, or updating existing countermeasures you put in</a:t>
-            </a:r>
+              <a:t>Middleware for a framework to make things more secure, proxies to reject requests hetaeristically, </a:t>
+            </a:r>
+            <a:r>
+              <a:rPr lang="en-US" dirty="0" err="1" smtClean="0"/>
+              <a:t>etc</a:t>
+            </a:r>
+            <a:endParaRPr lang="en-US" dirty="0" smtClean="0"/>
+          </a:p>
+          <a:p>
             <a:endParaRPr lang="en-US" dirty="0"/>
           </a:p>
         </p:txBody>
@@ -13500,7 +13617,7 @@
     </p:spTree>
     <p:extLst>
       <p:ext uri="{BB962C8B-B14F-4D97-AF65-F5344CB8AC3E}">
-        <p14:creationId xmlns:p14="http://schemas.microsoft.com/office/powerpoint/2010/main" val="2519537454"/>
+        <p14:creationId xmlns:p14="http://schemas.microsoft.com/office/powerpoint/2010/main" val="899743146"/>
       </p:ext>
     </p:extLst>
   </p:cSld>
@@ -13551,6 +13668,103 @@
           <a:p>
             <a:r>
               <a:rPr lang="en-US" dirty="0" smtClean="0"/>
+              <a:t>Implementing countermeasures (CONT.)</a:t>
+            </a:r>
+            <a:endParaRPr lang="en-US" dirty="0"/>
+          </a:p>
+        </p:txBody>
+      </p:sp>
+      <p:sp>
+        <p:nvSpPr>
+          <p:cNvPr id="3" name="Content Placeholder 2"/>
+          <p:cNvSpPr>
+            <a:spLocks noGrp="1"/>
+          </p:cNvSpPr>
+          <p:nvPr>
+            <p:ph idx="1"/>
+          </p:nvPr>
+        </p:nvSpPr>
+        <p:spPr/>
+        <p:txBody>
+          <a:bodyPr/>
+          <a:lstStyle/>
+          <a:p>
+            <a:r>
+              <a:rPr lang="en-US" dirty="0" smtClean="0"/>
+              <a:t>While coding the application</a:t>
+            </a:r>
+          </a:p>
+          <a:p>
+            <a:pPr lvl="1"/>
+            <a:r>
+              <a:rPr lang="en-US" dirty="0" smtClean="0"/>
+              <a:t>Refer back to threat model to make sure assets are protected</a:t>
+            </a:r>
+          </a:p>
+          <a:p>
+            <a:pPr lvl="1"/>
+            <a:r>
+              <a:rPr lang="en-US" dirty="0" smtClean="0"/>
+              <a:t>Update the threat model to reflect new attacks vectors, changes in assets or roles, or updating existing countermeasures you put in</a:t>
+            </a:r>
+            <a:endParaRPr lang="en-US" dirty="0"/>
+          </a:p>
+        </p:txBody>
+      </p:sp>
+    </p:spTree>
+    <p:extLst>
+      <p:ext uri="{BB962C8B-B14F-4D97-AF65-F5344CB8AC3E}">
+        <p14:creationId xmlns:p14="http://schemas.microsoft.com/office/powerpoint/2010/main" val="2519537454"/>
+      </p:ext>
+    </p:extLst>
+  </p:cSld>
+  <p:clrMapOvr>
+    <a:masterClrMapping/>
+  </p:clrMapOvr>
+  <p:timing>
+    <p:tnLst>
+      <p:par>
+        <p:cTn id="1" dur="indefinite" restart="never" nodeType="tmRoot"/>
+      </p:par>
+    </p:tnLst>
+  </p:timing>
+</p:sld>
+</file>
+
+<file path=ppt/slides/slide15.xml><?xml version="1.0" encoding="utf-8"?>
+<p:sld xmlns:a="http://schemas.openxmlformats.org/drawingml/2006/main" xmlns:r="http://schemas.openxmlformats.org/officeDocument/2006/relationships" xmlns:p="http://schemas.openxmlformats.org/presentationml/2006/main">
+  <p:cSld>
+    <p:spTree>
+      <p:nvGrpSpPr>
+        <p:cNvPr id="1" name=""/>
+        <p:cNvGrpSpPr/>
+        <p:nvPr/>
+      </p:nvGrpSpPr>
+      <p:grpSpPr>
+        <a:xfrm>
+          <a:off x="0" y="0"/>
+          <a:ext cx="0" cy="0"/>
+          <a:chOff x="0" y="0"/>
+          <a:chExt cx="0" cy="0"/>
+        </a:xfrm>
+      </p:grpSpPr>
+      <p:sp>
+        <p:nvSpPr>
+          <p:cNvPr id="2" name="Title 1"/>
+          <p:cNvSpPr>
+            <a:spLocks noGrp="1"/>
+          </p:cNvSpPr>
+          <p:nvPr>
+            <p:ph type="title"/>
+          </p:nvPr>
+        </p:nvSpPr>
+        <p:spPr/>
+        <p:txBody>
+          <a:bodyPr/>
+          <a:lstStyle/>
+          <a:p>
+            <a:r>
+              <a:rPr lang="en-US" dirty="0" smtClean="0"/>
               <a:t>Resources</a:t>
             </a:r>
             <a:endParaRPr lang="en-US" dirty="0"/>
@@ -13688,7 +13902,7 @@
 </p:sld>
 </file>
 
-<file path=ppt/slides/slide15.xml><?xml version="1.0" encoding="utf-8"?>
+<file path=ppt/slides/slide16.xml><?xml version="1.0" encoding="utf-8"?>
 <p:sld xmlns:a="http://schemas.openxmlformats.org/drawingml/2006/main" xmlns:r="http://schemas.openxmlformats.org/officeDocument/2006/relationships" xmlns:p="http://schemas.openxmlformats.org/presentationml/2006/main">
   <p:cSld>
     <p:spTree>
@@ -13817,11 +14031,7 @@
           <a:p>
             <a:r>
               <a:rPr lang="en-US" dirty="0" smtClean="0"/>
-              <a:t>Example </a:t>
-            </a:r>
-            <a:r>
-              <a:rPr lang="en-US" dirty="0" smtClean="0"/>
-              <a:t>application (“Pay to post”)</a:t>
+              <a:t>Example application (“Pay to post”)</a:t>
             </a:r>
             <a:endParaRPr lang="en-US" dirty="0"/>
           </a:p>
@@ -13969,11 +14179,7 @@
             </a:pPr>
             <a:r>
               <a:rPr lang="en-US" dirty="0" smtClean="0"/>
-              <a:t>Public user </a:t>
-            </a:r>
-            <a:r>
-              <a:rPr lang="en-US" dirty="0" smtClean="0"/>
-              <a:t>info</a:t>
+              <a:t>Public user info</a:t>
             </a:r>
           </a:p>
           <a:p>
@@ -13993,11 +14199,7 @@
             </a:pPr>
             <a:r>
               <a:rPr lang="en-US" dirty="0" smtClean="0"/>
-              <a:t>Authentication </a:t>
-            </a:r>
-            <a:r>
-              <a:rPr lang="en-US" dirty="0" smtClean="0"/>
-              <a:t>Tokens</a:t>
+              <a:t>Authentication Tokens</a:t>
             </a:r>
           </a:p>
           <a:p>
@@ -14009,7 +14211,6 @@
               <a:rPr lang="en-US" dirty="0" smtClean="0"/>
               <a:t>Anonymous and non-anonymous posts</a:t>
             </a:r>
-            <a:endParaRPr lang="en-US" dirty="0" smtClean="0"/>
           </a:p>
           <a:p>
             <a:pPr marL="285750" indent="-285750">
@@ -14145,11 +14346,7 @@
             </a:pPr>
             <a:r>
               <a:rPr lang="en-US" dirty="0" smtClean="0"/>
-              <a:t>Users can pay a little more for anonymous </a:t>
-            </a:r>
-            <a:r>
-              <a:rPr lang="en-US" dirty="0" smtClean="0"/>
-              <a:t>comments</a:t>
+              <a:t>Users can pay a little more for anonymous comments</a:t>
             </a:r>
           </a:p>
           <a:p>
@@ -14159,11 +14356,7 @@
             </a:pPr>
             <a:r>
               <a:rPr lang="en-US" dirty="0" smtClean="0"/>
-              <a:t>Spam </a:t>
-            </a:r>
-            <a:r>
-              <a:rPr lang="en-US" dirty="0" smtClean="0"/>
-              <a:t>mail is sent to the user’s address for additional revenue stream</a:t>
+              <a:t>Spam mail is sent to the user’s address for additional revenue stream</a:t>
             </a:r>
           </a:p>
           <a:p>
@@ -14237,7 +14430,11 @@
           <a:p>
             <a:r>
               <a:rPr lang="en-US" dirty="0" smtClean="0"/>
-              <a:t>What is a threat</a:t>
+              <a:t>What is a </a:t>
+            </a:r>
+            <a:r>
+              <a:rPr lang="en-US" dirty="0" smtClean="0"/>
+              <a:t>threat?</a:t>
             </a:r>
             <a:endParaRPr lang="en-US" dirty="0"/>
           </a:p>
@@ -14277,13 +14474,8 @@
             </a:r>
             <a:r>
               <a:rPr lang="en-US" dirty="0" smtClean="0"/>
-              <a:t>,  physical </a:t>
-            </a:r>
-            <a:r>
-              <a:rPr lang="en-US" dirty="0" smtClean="0"/>
-              <a:t>damage, and disclosure, modification, or destruction of data</a:t>
-            </a:r>
-            <a:endParaRPr lang="en-US" dirty="0" smtClean="0"/>
+              <a:t>,  physical damage, and disclosure, modification, or destruction of data</a:t>
+            </a:r>
           </a:p>
           <a:p>
             <a:r>
@@ -14421,6 +14613,127 @@
           <a:p>
             <a:r>
               <a:rPr lang="en-US" dirty="0" smtClean="0"/>
+              <a:t>What is a vulnerability?</a:t>
+            </a:r>
+            <a:endParaRPr lang="en-US" dirty="0"/>
+          </a:p>
+        </p:txBody>
+      </p:sp>
+      <p:sp>
+        <p:nvSpPr>
+          <p:cNvPr id="3" name="Content Placeholder 2"/>
+          <p:cNvSpPr>
+            <a:spLocks noGrp="1"/>
+          </p:cNvSpPr>
+          <p:nvPr>
+            <p:ph idx="1"/>
+          </p:nvPr>
+        </p:nvSpPr>
+        <p:spPr/>
+        <p:txBody>
+          <a:bodyPr/>
+          <a:lstStyle/>
+          <a:p>
+            <a:r>
+              <a:rPr lang="en-US" dirty="0" smtClean="0"/>
+              <a:t>A </a:t>
+            </a:r>
+            <a:r>
+              <a:rPr lang="en-US" dirty="0" err="1" smtClean="0"/>
+              <a:t>tangiable</a:t>
+            </a:r>
+            <a:r>
+              <a:rPr lang="en-US" dirty="0" smtClean="0"/>
+              <a:t> issue with an application that an attacker can use to cause harm</a:t>
+            </a:r>
+          </a:p>
+          <a:p>
+            <a:pPr lvl="1"/>
+            <a:r>
+              <a:rPr lang="en-US" dirty="0" smtClean="0"/>
+              <a:t>Can be a design or implementation issue</a:t>
+            </a:r>
+          </a:p>
+          <a:p>
+            <a:r>
+              <a:rPr lang="en-US" dirty="0" smtClean="0"/>
+              <a:t>Examples:</a:t>
+            </a:r>
+          </a:p>
+          <a:p>
+            <a:pPr lvl="1"/>
+            <a:r>
+              <a:rPr lang="en-US" dirty="0" smtClean="0"/>
+              <a:t>SQL Injection, Cross site scripting, Cross site request forgery</a:t>
+            </a:r>
+          </a:p>
+          <a:p>
+            <a:r>
+              <a:rPr lang="en-US" dirty="0" smtClean="0"/>
+              <a:t>Vulnerabilities can cause lasting damage to a company’s reputation, user base, or infrastructure</a:t>
+            </a:r>
+          </a:p>
+          <a:p>
+            <a:r>
+              <a:rPr lang="en-US" dirty="0" smtClean="0"/>
+              <a:t>These need to be avoided at all costs!</a:t>
+            </a:r>
+          </a:p>
+          <a:p>
+            <a:endParaRPr lang="en-US" dirty="0" smtClean="0"/>
+          </a:p>
+          <a:p>
+            <a:endParaRPr lang="en-US" dirty="0"/>
+          </a:p>
+        </p:txBody>
+      </p:sp>
+    </p:spTree>
+    <p:extLst>
+      <p:ext uri="{BB962C8B-B14F-4D97-AF65-F5344CB8AC3E}">
+        <p14:creationId xmlns:p14="http://schemas.microsoft.com/office/powerpoint/2010/main" val="3447819432"/>
+      </p:ext>
+    </p:extLst>
+  </p:cSld>
+  <p:clrMapOvr>
+    <a:masterClrMapping/>
+  </p:clrMapOvr>
+</p:sld>
+</file>
+
+<file path=ppt/slides/slide5.xml><?xml version="1.0" encoding="utf-8"?>
+<p:sld xmlns:a="http://schemas.openxmlformats.org/drawingml/2006/main" xmlns:r="http://schemas.openxmlformats.org/officeDocument/2006/relationships" xmlns:p="http://schemas.openxmlformats.org/presentationml/2006/main">
+  <p:cSld>
+    <p:spTree>
+      <p:nvGrpSpPr>
+        <p:cNvPr id="1" name=""/>
+        <p:cNvGrpSpPr/>
+        <p:nvPr/>
+      </p:nvGrpSpPr>
+      <p:grpSpPr>
+        <a:xfrm>
+          <a:off x="0" y="0"/>
+          <a:ext cx="0" cy="0"/>
+          <a:chOff x="0" y="0"/>
+          <a:chExt cx="0" cy="0"/>
+        </a:xfrm>
+      </p:grpSpPr>
+      <p:sp>
+        <p:nvSpPr>
+          <p:cNvPr id="2" name="Title 1"/>
+          <p:cNvSpPr>
+            <a:spLocks noGrp="1"/>
+          </p:cNvSpPr>
+          <p:nvPr>
+            <p:ph type="title"/>
+          </p:nvPr>
+        </p:nvSpPr>
+        <p:spPr/>
+        <p:txBody>
+          <a:bodyPr/>
+          <a:lstStyle/>
+          <a:p>
+            <a:r>
+              <a:rPr lang="en-US" dirty="0" smtClean="0"/>
               <a:t>What is threat modeling</a:t>
             </a:r>
             <a:endParaRPr lang="en-US" dirty="0"/>
@@ -14529,104 +14842,6 @@
 </p:sld>
 </file>
 
-<file path=ppt/slides/slide5.xml><?xml version="1.0" encoding="utf-8"?>
-<p:sld xmlns:a="http://schemas.openxmlformats.org/drawingml/2006/main" xmlns:r="http://schemas.openxmlformats.org/officeDocument/2006/relationships" xmlns:p="http://schemas.openxmlformats.org/presentationml/2006/main">
-  <p:cSld>
-    <p:spTree>
-      <p:nvGrpSpPr>
-        <p:cNvPr id="1" name=""/>
-        <p:cNvGrpSpPr/>
-        <p:nvPr/>
-      </p:nvGrpSpPr>
-      <p:grpSpPr>
-        <a:xfrm>
-          <a:off x="0" y="0"/>
-          <a:ext cx="0" cy="0"/>
-          <a:chOff x="0" y="0"/>
-          <a:chExt cx="0" cy="0"/>
-        </a:xfrm>
-      </p:grpSpPr>
-      <p:sp>
-        <p:nvSpPr>
-          <p:cNvPr id="5" name="Title 4"/>
-          <p:cNvSpPr>
-            <a:spLocks noGrp="1"/>
-          </p:cNvSpPr>
-          <p:nvPr>
-            <p:ph type="title"/>
-          </p:nvPr>
-        </p:nvSpPr>
-        <p:spPr/>
-        <p:txBody>
-          <a:bodyPr/>
-          <a:lstStyle/>
-          <a:p>
-            <a:r>
-              <a:rPr lang="en-US" dirty="0" smtClean="0"/>
-              <a:t>Why write a threat model?</a:t>
-            </a:r>
-            <a:endParaRPr lang="en-US" dirty="0"/>
-          </a:p>
-        </p:txBody>
-      </p:sp>
-      <p:sp>
-        <p:nvSpPr>
-          <p:cNvPr id="6" name="Content Placeholder 5"/>
-          <p:cNvSpPr>
-            <a:spLocks noGrp="1"/>
-          </p:cNvSpPr>
-          <p:nvPr>
-            <p:ph idx="1"/>
-          </p:nvPr>
-        </p:nvSpPr>
-        <p:spPr/>
-        <p:txBody>
-          <a:bodyPr/>
-          <a:lstStyle/>
-          <a:p>
-            <a:r>
-              <a:rPr lang="en-US" dirty="0" smtClean="0"/>
-              <a:t>Ensure all the code written with a secure mindset</a:t>
-            </a:r>
-          </a:p>
-          <a:p>
-            <a:pPr lvl="1"/>
-            <a:r>
-              <a:rPr lang="en-US" dirty="0" smtClean="0"/>
-              <a:t>Can this code allow an attacker to attack my application? If yes, how do I stop him/her?</a:t>
-            </a:r>
-          </a:p>
-          <a:p>
-            <a:r>
-              <a:rPr lang="en-US" dirty="0" smtClean="0"/>
-              <a:t>This is a good thing to talk about at the presentations in December – threat modeling and security issues came across during the development of the application</a:t>
-            </a:r>
-          </a:p>
-          <a:p>
-            <a:endParaRPr lang="en-US" dirty="0"/>
-          </a:p>
-        </p:txBody>
-      </p:sp>
-    </p:spTree>
-    <p:extLst>
-      <p:ext uri="{BB962C8B-B14F-4D97-AF65-F5344CB8AC3E}">
-        <p14:creationId xmlns:p14="http://schemas.microsoft.com/office/powerpoint/2010/main" val="1880207843"/>
-      </p:ext>
-    </p:extLst>
-  </p:cSld>
-  <p:clrMapOvr>
-    <a:masterClrMapping/>
-  </p:clrMapOvr>
-  <p:timing>
-    <p:tnLst>
-      <p:par>
-        <p:cTn id="1" dur="indefinite" restart="never" nodeType="tmRoot"/>
-      </p:par>
-    </p:tnLst>
-  </p:timing>
-</p:sld>
-</file>
-
 <file path=ppt/slides/slide6.xml><?xml version="1.0" encoding="utf-8"?>
 <p:sld xmlns:a="http://schemas.openxmlformats.org/drawingml/2006/main" xmlns:r="http://schemas.openxmlformats.org/officeDocument/2006/relationships" xmlns:p="http://schemas.openxmlformats.org/presentationml/2006/main">
   <p:cSld>
@@ -14661,7 +14876,7 @@
           <a:p>
             <a:r>
               <a:rPr lang="en-US" dirty="0" smtClean="0"/>
-              <a:t>Writing a threat model</a:t>
+              <a:t>Why write a threat model?</a:t>
             </a:r>
             <a:endParaRPr lang="en-US" dirty="0"/>
           </a:p>
@@ -14679,65 +14894,25 @@
         </p:nvSpPr>
         <p:spPr/>
         <p:txBody>
-          <a:bodyPr>
-            <a:normAutofit/>
-          </a:bodyPr>
+          <a:bodyPr/>
           <a:lstStyle/>
           <a:p>
             <a:r>
               <a:rPr lang="en-US" dirty="0" smtClean="0"/>
-              <a:t>Identify assets and </a:t>
-            </a:r>
-            <a:r>
-              <a:rPr lang="en-US" dirty="0"/>
-              <a:t>roles</a:t>
-            </a:r>
-          </a:p>
-          <a:p>
-            <a:r>
-              <a:rPr lang="en-US" dirty="0"/>
-              <a:t>Identify existing </a:t>
-            </a:r>
+              <a:t>Ensure all the code written with a secure mindset</a:t>
+            </a:r>
+          </a:p>
+          <a:p>
+            <a:pPr lvl="1"/>
             <a:r>
               <a:rPr lang="en-US" dirty="0" smtClean="0"/>
-              <a:t>countermeasures</a:t>
-            </a:r>
-            <a:endParaRPr lang="en-US" dirty="0" smtClean="0"/>
+              <a:t>Can this code allow an attacker to attack my application? If yes, how do I stop him/her?</a:t>
+            </a:r>
           </a:p>
           <a:p>
             <a:r>
               <a:rPr lang="en-US" dirty="0" smtClean="0"/>
-              <a:t>Identify possible </a:t>
-            </a:r>
-            <a:r>
-              <a:rPr lang="en-US" dirty="0" smtClean="0"/>
-              <a:t>attackers</a:t>
-            </a:r>
-          </a:p>
-          <a:p>
-            <a:r>
-              <a:rPr lang="en-US" dirty="0" smtClean="0"/>
-              <a:t>Identify </a:t>
-            </a:r>
-            <a:r>
-              <a:rPr lang="en-US" dirty="0" smtClean="0"/>
-              <a:t>threats and possible vulnerabilities</a:t>
-            </a:r>
-          </a:p>
-          <a:p>
-            <a:r>
-              <a:rPr lang="en-US" dirty="0" smtClean="0"/>
-              <a:t>Identify </a:t>
-            </a:r>
-            <a:r>
-              <a:rPr lang="en-US" dirty="0" smtClean="0"/>
-              <a:t>countermeasures that are needed</a:t>
-            </a:r>
-          </a:p>
-          <a:p>
-            <a:r>
-              <a:rPr lang="en-US" dirty="0" smtClean="0"/>
-              <a:t>Implement countermeasures</a:t>
+              <a:t>This is a good thing to talk about at the presentations in December – threat modeling and security issues came across during the development of the application</a:t>
             </a:r>
           </a:p>
           <a:p>
@@ -14748,7 +14923,7 @@
     </p:spTree>
     <p:extLst>
       <p:ext uri="{BB962C8B-B14F-4D97-AF65-F5344CB8AC3E}">
-        <p14:creationId xmlns:p14="http://schemas.microsoft.com/office/powerpoint/2010/main" val="38559483"/>
+        <p14:creationId xmlns:p14="http://schemas.microsoft.com/office/powerpoint/2010/main" val="1880207843"/>
       </p:ext>
     </p:extLst>
   </p:cSld>
@@ -14784,7 +14959,7 @@
       </p:grpSpPr>
       <p:sp>
         <p:nvSpPr>
-          <p:cNvPr id="2" name="Title 1"/>
+          <p:cNvPr id="5" name="Title 4"/>
           <p:cNvSpPr>
             <a:spLocks noGrp="1"/>
           </p:cNvSpPr>
@@ -14799,7 +14974,7 @@
           <a:p>
             <a:r>
               <a:rPr lang="en-US" dirty="0" smtClean="0"/>
-              <a:t>Identifying assets and roles</a:t>
+              <a:t>Writing a threat model</a:t>
             </a:r>
             <a:endParaRPr lang="en-US" dirty="0"/>
           </a:p>
@@ -14807,7 +14982,7 @@
       </p:sp>
       <p:sp>
         <p:nvSpPr>
-          <p:cNvPr id="3" name="Content Placeholder 2"/>
+          <p:cNvPr id="6" name="Content Placeholder 5"/>
           <p:cNvSpPr>
             <a:spLocks noGrp="1"/>
           </p:cNvSpPr>
@@ -14818,74 +14993,54 @@
         <p:spPr/>
         <p:txBody>
           <a:bodyPr>
-            <a:normAutofit fontScale="70000" lnSpcReduction="20000"/>
+            <a:normAutofit/>
           </a:bodyPr>
           <a:lstStyle/>
           <a:p>
             <a:r>
               <a:rPr lang="en-US" dirty="0" smtClean="0"/>
-              <a:t>Generally data that must be secret, public with an assurance of validity, or vital to the integrity of the system</a:t>
-            </a:r>
-          </a:p>
-          <a:p>
+              <a:t>Identify assets and </a:t>
+            </a:r>
+            <a:r>
+              <a:rPr lang="en-US" dirty="0"/>
+              <a:t>roles</a:t>
+            </a:r>
+          </a:p>
+          <a:p>
+            <a:r>
+              <a:rPr lang="en-US" dirty="0"/>
+              <a:t>Identify existing </a:t>
+            </a:r>
             <a:r>
               <a:rPr lang="en-US" dirty="0" smtClean="0"/>
-              <a:t>Examples</a:t>
-            </a:r>
-          </a:p>
-          <a:p>
-            <a:pPr lvl="1"/>
+              <a:t>countermeasures</a:t>
+            </a:r>
+          </a:p>
+          <a:p>
             <a:r>
               <a:rPr lang="en-US" dirty="0" smtClean="0"/>
-              <a:t>PII – Personally Identifiable Information</a:t>
-            </a:r>
-          </a:p>
-          <a:p>
-            <a:pPr lvl="1"/>
+              <a:t>Identify possible attackers</a:t>
+            </a:r>
+          </a:p>
+          <a:p>
             <a:r>
               <a:rPr lang="en-US" dirty="0" smtClean="0"/>
-              <a:t>Authentication tokens</a:t>
-            </a:r>
-          </a:p>
-          <a:p>
-            <a:pPr lvl="1"/>
+              <a:t>Identify threats and possible vulnerabilities</a:t>
+            </a:r>
+          </a:p>
+          <a:p>
             <a:r>
               <a:rPr lang="en-US" dirty="0" smtClean="0"/>
-              <a:t>User data</a:t>
+              <a:t>Identify countermeasures that are needed</a:t>
             </a:r>
           </a:p>
           <a:p>
             <a:r>
               <a:rPr lang="en-US" dirty="0" smtClean="0"/>
-              <a:t>Which user groups should have access to which assets (always, sometimes, never)</a:t>
-            </a:r>
-          </a:p>
-          <a:p>
-            <a:r>
-              <a:rPr lang="en-US" dirty="0" smtClean="0"/>
-              <a:t>Examples</a:t>
-            </a:r>
-          </a:p>
-          <a:p>
-            <a:pPr lvl="1"/>
-            <a:r>
-              <a:rPr lang="en-US" dirty="0" smtClean="0"/>
-              <a:t>Anonymous user: Sometimes has access to user data (if it’s public), never has access to anything else</a:t>
-            </a:r>
-          </a:p>
-          <a:p>
-            <a:pPr lvl="1"/>
-            <a:r>
-              <a:rPr lang="en-US" dirty="0" smtClean="0"/>
-              <a:t>Normal user: Sometimes has access to user data and PII (if it’s public or their own), never has access to anything else</a:t>
-            </a:r>
-          </a:p>
-          <a:p>
-            <a:pPr lvl="1"/>
-            <a:r>
-              <a:rPr lang="en-US" dirty="0" smtClean="0"/>
-              <a:t>Admin user: Always has access to everything </a:t>
-            </a:r>
+              <a:t>Implement countermeasures</a:t>
+            </a:r>
+          </a:p>
+          <a:p>
             <a:endParaRPr lang="en-US" dirty="0"/>
           </a:p>
         </p:txBody>
@@ -14893,7 +15048,7 @@
     </p:spTree>
     <p:extLst>
       <p:ext uri="{BB962C8B-B14F-4D97-AF65-F5344CB8AC3E}">
-        <p14:creationId xmlns:p14="http://schemas.microsoft.com/office/powerpoint/2010/main" val="1360166216"/>
+        <p14:creationId xmlns:p14="http://schemas.microsoft.com/office/powerpoint/2010/main" val="38559483"/>
       </p:ext>
     </p:extLst>
   </p:cSld>
@@ -14944,7 +15099,7 @@
           <a:p>
             <a:r>
               <a:rPr lang="en-US" dirty="0" smtClean="0"/>
-              <a:t>Identify existing countermeasures</a:t>
+              <a:t>Identifying assets and roles</a:t>
             </a:r>
             <a:endParaRPr lang="en-US" dirty="0"/>
           </a:p>
@@ -14962,58 +15117,75 @@
         </p:nvSpPr>
         <p:spPr/>
         <p:txBody>
-          <a:bodyPr/>
+          <a:bodyPr>
+            <a:normAutofit fontScale="70000" lnSpcReduction="20000"/>
+          </a:bodyPr>
           <a:lstStyle/>
           <a:p>
             <a:r>
               <a:rPr lang="en-US" dirty="0" smtClean="0"/>
-              <a:t>Language/Framework</a:t>
+              <a:t>Generally data that must be secret, public with an assurance of validity, or vital to the integrity of the system</a:t>
+            </a:r>
+          </a:p>
+          <a:p>
+            <a:r>
+              <a:rPr lang="en-US" dirty="0" smtClean="0"/>
+              <a:t>Examples</a:t>
             </a:r>
           </a:p>
           <a:p>
             <a:pPr lvl="1"/>
             <a:r>
               <a:rPr lang="en-US" dirty="0" smtClean="0"/>
-              <a:t>Example:</a:t>
-            </a:r>
-          </a:p>
-          <a:p>
-            <a:pPr lvl="2"/>
+              <a:t>PII – Personally Identifiable Information</a:t>
+            </a:r>
+          </a:p>
+          <a:p>
+            <a:pPr lvl="1"/>
             <a:r>
               <a:rPr lang="en-US" dirty="0" smtClean="0"/>
-              <a:t>JavaScript – Buffer overflows are rare because the language doesn’t provide direct memory access</a:t>
-            </a:r>
-          </a:p>
-          <a:p>
-            <a:pPr lvl="2"/>
+              <a:t>Authentication tokens</a:t>
+            </a:r>
+          </a:p>
+          <a:p>
+            <a:pPr lvl="1"/>
             <a:r>
               <a:rPr lang="en-US" dirty="0" smtClean="0"/>
-              <a:t>Django – CSRF protection bundled into all forms by default</a:t>
+              <a:t>User data</a:t>
             </a:r>
           </a:p>
           <a:p>
             <a:r>
               <a:rPr lang="en-US" dirty="0" smtClean="0"/>
-              <a:t>Implemented in codebase already</a:t>
+              <a:t>Which user groups should have access to which assets (always, sometimes, never)</a:t>
+            </a:r>
+          </a:p>
+          <a:p>
+            <a:r>
+              <a:rPr lang="en-US" dirty="0" smtClean="0"/>
+              <a:t>Examples</a:t>
             </a:r>
           </a:p>
           <a:p>
             <a:pPr lvl="1"/>
             <a:r>
               <a:rPr lang="en-US" dirty="0" smtClean="0"/>
-              <a:t>Taking over a project or doing a threat model after </a:t>
-            </a:r>
-            <a:r>
-              <a:rPr lang="en-US" dirty="0" err="1" smtClean="0"/>
-              <a:t>codewriting</a:t>
-            </a:r>
+              <a:t>Anonymous user: Sometimes has access to user data (if it’s public), never has access to anything else</a:t>
+            </a:r>
+          </a:p>
+          <a:p>
+            <a:pPr lvl="1"/>
             <a:r>
               <a:rPr lang="en-US" dirty="0" smtClean="0"/>
-              <a:t> has started</a:t>
+              <a:t>Normal user: Sometimes has access to user data and PII (if it’s public or their own), never has access to anything else</a:t>
             </a:r>
           </a:p>
           <a:p>
             <a:pPr lvl="1"/>
+            <a:r>
+              <a:rPr lang="en-US" dirty="0" smtClean="0"/>
+              <a:t>Admin user: Always has access to everything </a:t>
+            </a:r>
             <a:endParaRPr lang="en-US" dirty="0"/>
           </a:p>
         </p:txBody>
@@ -15021,7 +15193,7 @@
     </p:spTree>
     <p:extLst>
       <p:ext uri="{BB962C8B-B14F-4D97-AF65-F5344CB8AC3E}">
-        <p14:creationId xmlns:p14="http://schemas.microsoft.com/office/powerpoint/2010/main" val="687256859"/>
+        <p14:creationId xmlns:p14="http://schemas.microsoft.com/office/powerpoint/2010/main" val="1360166216"/>
       </p:ext>
     </p:extLst>
   </p:cSld>
@@ -15072,7 +15244,7 @@
           <a:p>
             <a:r>
               <a:rPr lang="en-US" dirty="0" smtClean="0"/>
-              <a:t>Identify possible attackers</a:t>
+              <a:t>Identify existing countermeasures</a:t>
             </a:r>
             <a:endParaRPr lang="en-US" dirty="0"/>
           </a:p>
@@ -15090,59 +15262,55 @@
         </p:nvSpPr>
         <p:spPr/>
         <p:txBody>
-          <a:bodyPr>
-            <a:normAutofit/>
-          </a:bodyPr>
+          <a:bodyPr/>
           <a:lstStyle/>
           <a:p>
             <a:r>
               <a:rPr lang="en-US" dirty="0" smtClean="0"/>
-              <a:t>Who will be attacking the application and why? What level of security will the application need and what are the consequences of attacks</a:t>
-            </a:r>
-          </a:p>
-          <a:p>
+              <a:t>Language/Framework</a:t>
+            </a:r>
+          </a:p>
+          <a:p>
+            <a:pPr lvl="1"/>
             <a:r>
               <a:rPr lang="en-US" dirty="0" smtClean="0"/>
-              <a:t>Examples: </a:t>
+              <a:t>Example:</a:t>
+            </a:r>
+          </a:p>
+          <a:p>
+            <a:pPr lvl="2"/>
+            <a:r>
+              <a:rPr lang="en-US" dirty="0" smtClean="0"/>
+              <a:t>JavaScript – Buffer overflows are rare because the language doesn’t provide direct memory access</a:t>
+            </a:r>
+          </a:p>
+          <a:p>
+            <a:pPr lvl="2"/>
+            <a:r>
+              <a:rPr lang="en-US" dirty="0" smtClean="0"/>
+              <a:t>Django – CSRF protection bundled into all forms by default</a:t>
+            </a:r>
+          </a:p>
+          <a:p>
+            <a:r>
+              <a:rPr lang="en-US" dirty="0" smtClean="0"/>
+              <a:t>Implemented in codebase already</a:t>
             </a:r>
           </a:p>
           <a:p>
             <a:pPr lvl="1"/>
             <a:r>
               <a:rPr lang="en-US" dirty="0" smtClean="0"/>
-              <a:t>Online games have hackers who want to gain an unfair advantage – Low </a:t>
-            </a:r>
-            <a:endParaRPr lang="en-US" dirty="0"/>
-          </a:p>
-          <a:p>
-            <a:pPr lvl="1"/>
-            <a:r>
-              <a:rPr lang="en-US" dirty="0"/>
-              <a:t>E-commerce sites have credit card data which criminals can </a:t>
+              <a:t>Taking over a project or doing a threat model after </a:t>
+            </a:r>
+            <a:r>
+              <a:rPr lang="en-US" dirty="0" err="1" smtClean="0"/>
+              <a:t>codewriting</a:t>
             </a:r>
             <a:r>
               <a:rPr lang="en-US" dirty="0" smtClean="0"/>
-              <a:t>use </a:t>
-            </a:r>
-            <a:r>
-              <a:rPr lang="en-US" dirty="0"/>
-              <a:t>or </a:t>
-            </a:r>
-            <a:r>
-              <a:rPr lang="en-US" dirty="0" smtClean="0"/>
-              <a:t>sell – Medium </a:t>
-            </a:r>
-          </a:p>
-          <a:p>
-            <a:pPr lvl="1"/>
-            <a:r>
-              <a:rPr lang="en-US" dirty="0" smtClean="0"/>
-              <a:t>Encrypted messaging services have federal governments who want to read the contents of the messages sent – High </a:t>
-            </a:r>
-          </a:p>
-          <a:p>
-            <a:pPr lvl="1"/>
-            <a:endParaRPr lang="en-US" dirty="0" smtClean="0"/>
+              <a:t> has started</a:t>
+            </a:r>
           </a:p>
           <a:p>
             <a:pPr lvl="1"/>
@@ -15153,7 +15321,7 @@
     </p:spTree>
     <p:extLst>
       <p:ext uri="{BB962C8B-B14F-4D97-AF65-F5344CB8AC3E}">
-        <p14:creationId xmlns:p14="http://schemas.microsoft.com/office/powerpoint/2010/main" val="268462443"/>
+        <p14:creationId xmlns:p14="http://schemas.microsoft.com/office/powerpoint/2010/main" val="687256859"/>
       </p:ext>
     </p:extLst>
   </p:cSld>

</xml_diff>